<commit_message>
Updated Intro Stats Slides
</commit_message>
<xml_diff>
--- a/CCHMC Microbiome Workshop - Intro to Stats - 7-15-19.pptx
+++ b/CCHMC Microbiome Workshop - Intro to Stats - 7-15-19.pptx
@@ -8,20 +8,19 @@
     <p:sldMasterId id="2147483712" r:id="rId4"/>
   </p:sldMasterIdLst>
   <p:notesMasterIdLst>
-    <p:notesMasterId r:id="rId16"/>
+    <p:notesMasterId r:id="rId15"/>
   </p:notesMasterIdLst>
   <p:sldIdLst>
     <p:sldId id="262" r:id="rId5"/>
-    <p:sldId id="267" r:id="rId6"/>
-    <p:sldId id="268" r:id="rId7"/>
+    <p:sldId id="268" r:id="rId6"/>
+    <p:sldId id="267" r:id="rId7"/>
     <p:sldId id="270" r:id="rId8"/>
     <p:sldId id="273" r:id="rId9"/>
     <p:sldId id="274" r:id="rId10"/>
     <p:sldId id="275" r:id="rId11"/>
     <p:sldId id="276" r:id="rId12"/>
     <p:sldId id="277" r:id="rId13"/>
-    <p:sldId id="278" r:id="rId14"/>
-    <p:sldId id="279" r:id="rId15"/>
+    <p:sldId id="279" r:id="rId14"/>
   </p:sldIdLst>
   <p:sldSz cx="12192000" cy="6858000"/>
   <p:notesSz cx="6858000" cy="9144000"/>
@@ -1899,7 +1898,7 @@
         <a:lstStyle/>
         <a:p>
           <a:r>
-            <a:rPr lang="en-US" b="1" dirty="0" err="1" smtClean="0">
+            <a:rPr lang="en-US" b="1" dirty="0" err="1">
               <a:effectLst>
                 <a:outerShdw blurRad="38100" dist="38100" dir="2700000" algn="tl">
                   <a:srgbClr val="000000">
@@ -2077,13 +2076,6 @@
           </a:stretch>
         </a:blipFill>
       </dgm:spPr>
-      <dgm:t>
-        <a:bodyPr/>
-        <a:lstStyle/>
-        <a:p>
-          <a:endParaRPr lang="en-US"/>
-        </a:p>
-      </dgm:t>
     </dgm:pt>
     <dgm:pt modelId="{CB61C50C-2B24-451C-AE7C-50E1ACF1538C}" type="pres">
       <dgm:prSet presAssocID="{9CF6299E-29BE-424F-B9C7-62C55690B391}" presName="wedgeRectCallout1" presStyleLbl="node1" presStyleIdx="2" presStyleCnt="6">
@@ -2173,13 +2165,6 @@
           </a:stretch>
         </a:blipFill>
       </dgm:spPr>
-      <dgm:t>
-        <a:bodyPr/>
-        <a:lstStyle/>
-        <a:p>
-          <a:endParaRPr lang="en-US"/>
-        </a:p>
-      </dgm:t>
     </dgm:pt>
     <dgm:pt modelId="{7571AAA0-297E-4056-A5A9-3460BB5F057A}" type="pres">
       <dgm:prSet presAssocID="{D4B7F270-4CFB-46B3-AA6B-6B5F87298AFA}" presName="wedgeRectCallout1" presStyleLbl="node1" presStyleIdx="4" presStyleCnt="6">
@@ -2246,19 +2231,19 @@
     </dgm:pt>
   </dgm:ptLst>
   <dgm:cxnLst>
+    <dgm:cxn modelId="{B3C98D31-CB8B-45CE-9262-5396273CCB0B}" type="presOf" srcId="{9CF6299E-29BE-424F-B9C7-62C55690B391}" destId="{CB61C50C-2B24-451C-AE7C-50E1ACF1538C}" srcOrd="0" destOrd="0" presId="urn:microsoft.com/office/officeart/2008/layout/BendingPictureCaptionList"/>
+    <dgm:cxn modelId="{20C5E507-49E3-48E9-82C1-C9E4EF6FCCCA}" type="presOf" srcId="{D4B7F270-4CFB-46B3-AA6B-6B5F87298AFA}" destId="{7571AAA0-297E-4056-A5A9-3460BB5F057A}" srcOrd="0" destOrd="0" presId="urn:microsoft.com/office/officeart/2008/layout/BendingPictureCaptionList"/>
     <dgm:cxn modelId="{78C9485E-F8FF-42C1-BD88-DC4DF086D4EF}" srcId="{5110010E-63E4-4571-AA5F-CF8C0E5886DD}" destId="{D4B7F270-4CFB-46B3-AA6B-6B5F87298AFA}" srcOrd="4" destOrd="0" parTransId="{420158A9-2A9F-4B02-B2F3-525EBBD68851}" sibTransId="{89EDFE43-E350-41DF-BFAE-BAE8A1DA444F}"/>
     <dgm:cxn modelId="{948F2F49-E082-4F58-A648-18B47C3E221E}" type="presOf" srcId="{CCD82E2B-C45E-4165-9AE4-0E20D5CFF537}" destId="{D9541874-5497-40F1-ABB9-9203914712FC}" srcOrd="0" destOrd="0" presId="urn:microsoft.com/office/officeart/2008/layout/BendingPictureCaptionList"/>
+    <dgm:cxn modelId="{5B293334-1C5D-4CC1-BC6D-878954116DA8}" type="presOf" srcId="{54564EBA-6E41-4D84-8204-7971C7E5FE9C}" destId="{9A5227B7-A029-4951-9F90-8F8B648E4F0D}" srcOrd="0" destOrd="0" presId="urn:microsoft.com/office/officeart/2008/layout/BendingPictureCaptionList"/>
+    <dgm:cxn modelId="{1077AE3A-EAB6-445D-8947-A52211AF5DA6}" srcId="{5110010E-63E4-4571-AA5F-CF8C0E5886DD}" destId="{54564EBA-6E41-4D84-8204-7971C7E5FE9C}" srcOrd="3" destOrd="0" parTransId="{156403B4-D40F-4506-BA54-1E5DD46929A5}" sibTransId="{7FE90E53-9EF8-4764-A33C-2BC534DA91E0}"/>
+    <dgm:cxn modelId="{9E679090-14C1-431F-BFD6-452C78BCDA14}" srcId="{5110010E-63E4-4571-AA5F-CF8C0E5886DD}" destId="{9CF6299E-29BE-424F-B9C7-62C55690B391}" srcOrd="2" destOrd="0" parTransId="{F6F05F54-3F8F-4D92-A739-BEAC12BD9DF9}" sibTransId="{12F89172-3239-437D-BCC0-DB068D268F73}"/>
     <dgm:cxn modelId="{109ED6EF-BCF6-4C1C-A245-360FA413C231}" type="presOf" srcId="{5110010E-63E4-4571-AA5F-CF8C0E5886DD}" destId="{A5B5EC2E-0257-49C6-B14B-84657E008E5C}" srcOrd="0" destOrd="0" presId="urn:microsoft.com/office/officeart/2008/layout/BendingPictureCaptionList"/>
+    <dgm:cxn modelId="{89A2A9A4-1E37-4A45-85E6-2A0D11271B52}" srcId="{5110010E-63E4-4571-AA5F-CF8C0E5886DD}" destId="{1B9CF321-0D57-46C9-BD48-5D7A5841238F}" srcOrd="0" destOrd="0" parTransId="{536334C4-E787-4DE1-94E8-7D5E6CFF6664}" sibTransId="{8C4854AF-1A5E-4AB2-A7F1-F1C954B49FF4}"/>
+    <dgm:cxn modelId="{52F1926C-FC1F-419B-919F-00ADBE90524D}" type="presOf" srcId="{AE5F8560-BD98-4CD7-9FE3-0A24C7D28FDA}" destId="{5F66E83E-E710-4915-A800-4528DE7ECD8D}" srcOrd="0" destOrd="0" presId="urn:microsoft.com/office/officeart/2008/layout/BendingPictureCaptionList"/>
     <dgm:cxn modelId="{5F6E4327-FAE1-45AD-946F-2F1133FFDAC7}" type="presOf" srcId="{1B9CF321-0D57-46C9-BD48-5D7A5841238F}" destId="{35F318AC-115A-4998-8C80-0B4984B85896}" srcOrd="0" destOrd="0" presId="urn:microsoft.com/office/officeart/2008/layout/BendingPictureCaptionList"/>
-    <dgm:cxn modelId="{1077AE3A-EAB6-445D-8947-A52211AF5DA6}" srcId="{5110010E-63E4-4571-AA5F-CF8C0E5886DD}" destId="{54564EBA-6E41-4D84-8204-7971C7E5FE9C}" srcOrd="3" destOrd="0" parTransId="{156403B4-D40F-4506-BA54-1E5DD46929A5}" sibTransId="{7FE90E53-9EF8-4764-A33C-2BC534DA91E0}"/>
     <dgm:cxn modelId="{8D526676-69D6-488F-B7BA-7DF119967947}" srcId="{5110010E-63E4-4571-AA5F-CF8C0E5886DD}" destId="{AE5F8560-BD98-4CD7-9FE3-0A24C7D28FDA}" srcOrd="1" destOrd="0" parTransId="{05742FB4-C0E6-4BD1-A3A7-B390682A0C08}" sibTransId="{F8C4CCC5-B3DF-4B66-B4B4-E4DCDE1A5861}"/>
     <dgm:cxn modelId="{60988AF0-3AE2-42D9-9157-C52EB7B10256}" srcId="{5110010E-63E4-4571-AA5F-CF8C0E5886DD}" destId="{CCD82E2B-C45E-4165-9AE4-0E20D5CFF537}" srcOrd="5" destOrd="0" parTransId="{3E4C72FC-0A09-435C-9FC4-839AFA1DC2C0}" sibTransId="{647A95C5-DA2A-451C-9DA3-1574ABE5E5A9}"/>
-    <dgm:cxn modelId="{89A2A9A4-1E37-4A45-85E6-2A0D11271B52}" srcId="{5110010E-63E4-4571-AA5F-CF8C0E5886DD}" destId="{1B9CF321-0D57-46C9-BD48-5D7A5841238F}" srcOrd="0" destOrd="0" parTransId="{536334C4-E787-4DE1-94E8-7D5E6CFF6664}" sibTransId="{8C4854AF-1A5E-4AB2-A7F1-F1C954B49FF4}"/>
-    <dgm:cxn modelId="{5B293334-1C5D-4CC1-BC6D-878954116DA8}" type="presOf" srcId="{54564EBA-6E41-4D84-8204-7971C7E5FE9C}" destId="{9A5227B7-A029-4951-9F90-8F8B648E4F0D}" srcOrd="0" destOrd="0" presId="urn:microsoft.com/office/officeart/2008/layout/BendingPictureCaptionList"/>
-    <dgm:cxn modelId="{9E679090-14C1-431F-BFD6-452C78BCDA14}" srcId="{5110010E-63E4-4571-AA5F-CF8C0E5886DD}" destId="{9CF6299E-29BE-424F-B9C7-62C55690B391}" srcOrd="2" destOrd="0" parTransId="{F6F05F54-3F8F-4D92-A739-BEAC12BD9DF9}" sibTransId="{12F89172-3239-437D-BCC0-DB068D268F73}"/>
-    <dgm:cxn modelId="{20C5E507-49E3-48E9-82C1-C9E4EF6FCCCA}" type="presOf" srcId="{D4B7F270-4CFB-46B3-AA6B-6B5F87298AFA}" destId="{7571AAA0-297E-4056-A5A9-3460BB5F057A}" srcOrd="0" destOrd="0" presId="urn:microsoft.com/office/officeart/2008/layout/BendingPictureCaptionList"/>
-    <dgm:cxn modelId="{52F1926C-FC1F-419B-919F-00ADBE90524D}" type="presOf" srcId="{AE5F8560-BD98-4CD7-9FE3-0A24C7D28FDA}" destId="{5F66E83E-E710-4915-A800-4528DE7ECD8D}" srcOrd="0" destOrd="0" presId="urn:microsoft.com/office/officeart/2008/layout/BendingPictureCaptionList"/>
-    <dgm:cxn modelId="{B3C98D31-CB8B-45CE-9262-5396273CCB0B}" type="presOf" srcId="{9CF6299E-29BE-424F-B9C7-62C55690B391}" destId="{CB61C50C-2B24-451C-AE7C-50E1ACF1538C}" srcOrd="0" destOrd="0" presId="urn:microsoft.com/office/officeart/2008/layout/BendingPictureCaptionList"/>
     <dgm:cxn modelId="{A79FE671-73D2-4E55-9733-36DA05151713}" type="presParOf" srcId="{A5B5EC2E-0257-49C6-B14B-84657E008E5C}" destId="{B45A6766-BEA8-4667-B8E9-94733CE0AC17}" srcOrd="0" destOrd="0" presId="urn:microsoft.com/office/officeart/2008/layout/BendingPictureCaptionList"/>
     <dgm:cxn modelId="{789BC0C7-CC7F-4449-AD0A-17311D7B3A39}" type="presParOf" srcId="{B45A6766-BEA8-4667-B8E9-94733CE0AC17}" destId="{320796C4-DAAA-4E9B-B1EB-3FCCF853B751}" srcOrd="0" destOrd="0" presId="urn:microsoft.com/office/officeart/2008/layout/BendingPictureCaptionList"/>
     <dgm:cxn modelId="{1B12C01A-B4AF-4C80-8BC9-8567CF78BBA4}" type="presParOf" srcId="{B45A6766-BEA8-4667-B8E9-94733CE0AC17}" destId="{35F318AC-115A-4998-8C80-0B4984B85896}" srcOrd="1" destOrd="0" presId="urn:microsoft.com/office/officeart/2008/layout/BendingPictureCaptionList"/>
@@ -3625,7 +3610,7 @@
             </a:spcAft>
           </a:pPr>
           <a:r>
-            <a:rPr lang="en-US" sz="1500" b="1" kern="1200" dirty="0" err="1" smtClean="0">
+            <a:rPr lang="en-US" sz="1500" b="1" kern="1200" dirty="0" err="1">
               <a:effectLst>
                 <a:outerShdw blurRad="38100" dist="38100" dir="2700000" algn="tl">
                   <a:srgbClr val="000000">
@@ -6997,7 +6982,7 @@
           <a:p>
             <a:fld id="{E0D657DE-B2E3-41C1-BD97-DCA53B886A75}" type="datetimeFigureOut">
               <a:rPr lang="en-US" smtClean="0"/>
-              <a:t>7/5/2019</a:t>
+              <a:t>7/15/2019</a:t>
             </a:fld>
             <a:endParaRPr lang="en-US"/>
           </a:p>
@@ -7061,38 +7046,37 @@
           <a:p>
             <a:pPr lvl="0"/>
             <a:r>
-              <a:rPr lang="en-US" smtClean="0"/>
+              <a:rPr lang="en-US"/>
               <a:t>Click to edit Master text styles</a:t>
             </a:r>
           </a:p>
           <a:p>
             <a:pPr lvl="1"/>
             <a:r>
-              <a:rPr lang="en-US" smtClean="0"/>
+              <a:rPr lang="en-US"/>
               <a:t>Second level</a:t>
             </a:r>
           </a:p>
           <a:p>
             <a:pPr lvl="2"/>
             <a:r>
-              <a:rPr lang="en-US" smtClean="0"/>
+              <a:rPr lang="en-US"/>
               <a:t>Third level</a:t>
             </a:r>
           </a:p>
           <a:p>
             <a:pPr lvl="3"/>
             <a:r>
-              <a:rPr lang="en-US" smtClean="0"/>
+              <a:rPr lang="en-US"/>
               <a:t>Fourth level</a:t>
             </a:r>
           </a:p>
           <a:p>
             <a:pPr lvl="4"/>
             <a:r>
-              <a:rPr lang="en-US" smtClean="0"/>
+              <a:rPr lang="en-US"/>
               <a:t>Fifth level</a:t>
             </a:r>
-            <a:endParaRPr lang="en-US"/>
           </a:p>
         </p:txBody>
       </p:sp>
@@ -7335,7 +7319,7 @@
                 </a:solidFill>
               </a:rPr>
               <a:pPr/>
-              <a:t>2</a:t>
+              <a:t>3</a:t>
             </a:fld>
             <a:endParaRPr lang="en-US">
               <a:solidFill>
@@ -7598,7 +7582,7 @@
           <a:p>
             <a:pPr fontAlgn="base"/>
             <a:r>
-              <a:rPr lang="en-US" sz="1200" b="0" i="0" kern="1200" dirty="0" smtClean="0">
+              <a:rPr lang="en-US" sz="1200" b="0" i="0" kern="1200" dirty="0">
                 <a:solidFill>
                   <a:schemeClr val="tx1"/>
                 </a:solidFill>
@@ -7610,12 +7594,12 @@
               <a:t>Simple example from: </a:t>
             </a:r>
             <a:r>
-              <a:rPr lang="en-US" dirty="0" smtClean="0">
+              <a:rPr lang="en-US" dirty="0">
                 <a:hlinkClick r:id="rId3"/>
               </a:rPr>
               <a:t>https://www.statisticshowto.datasciencecentral.com/bray-curtis-dissimilarity/</a:t>
             </a:r>
-            <a:endParaRPr lang="en-US" sz="1200" b="0" i="0" kern="1200" dirty="0" smtClean="0">
+            <a:endParaRPr lang="en-US" sz="1200" b="0" i="0" kern="1200" dirty="0">
               <a:solidFill>
                 <a:schemeClr val="tx1"/>
               </a:solidFill>
@@ -7628,7 +7612,7 @@
           <a:p>
             <a:pPr fontAlgn="base"/>
             <a:r>
-              <a:rPr lang="en-US" sz="1200" b="0" i="0" kern="1200" dirty="0" smtClean="0">
+              <a:rPr lang="en-US" sz="1200" b="0" i="0" kern="1200" dirty="0">
                 <a:solidFill>
                   <a:schemeClr val="tx1"/>
                 </a:solidFill>
@@ -7643,7 +7627,7 @@
           <a:p>
             <a:pPr fontAlgn="base"/>
             <a:r>
-              <a:rPr lang="en-US" sz="1200" b="1" i="0" kern="1200" dirty="0" smtClean="0">
+              <a:rPr lang="en-US" sz="1200" b="1" i="0" kern="1200" dirty="0">
                 <a:solidFill>
                   <a:schemeClr val="tx1"/>
                 </a:solidFill>
@@ -7655,7 +7639,7 @@
               <a:t>Tank on</a:t>
             </a:r>
             <a:r>
-              <a:rPr lang="en-US" sz="1200" b="0" i="0" kern="1200" dirty="0" smtClean="0">
+              <a:rPr lang="en-US" sz="1200" b="0" i="0" kern="1200" dirty="0">
                 <a:solidFill>
                   <a:schemeClr val="tx1"/>
                 </a:solidFill>
@@ -7670,7 +7654,7 @@
           <a:p>
             <a:pPr fontAlgn="base"/>
             <a:r>
-              <a:rPr lang="en-US" sz="1200" b="1" i="0" kern="1200" dirty="0" smtClean="0">
+              <a:rPr lang="en-US" sz="1200" b="1" i="0" kern="1200" dirty="0">
                 <a:solidFill>
                   <a:schemeClr val="tx1"/>
                 </a:solidFill>
@@ -7682,7 +7666,7 @@
               <a:t>Tank two:</a:t>
             </a:r>
             <a:r>
-              <a:rPr lang="en-US" sz="1200" b="0" i="0" kern="1200" dirty="0" smtClean="0">
+              <a:rPr lang="en-US" sz="1200" b="0" i="0" kern="1200" dirty="0">
                 <a:solidFill>
                   <a:schemeClr val="tx1"/>
                 </a:solidFill>
@@ -7697,7 +7681,7 @@
           <a:p>
             <a:pPr fontAlgn="base"/>
             <a:r>
-              <a:rPr lang="en-US" sz="1200" b="0" i="0" kern="1200" dirty="0" smtClean="0">
+              <a:rPr lang="en-US" sz="1200" b="0" i="0" kern="1200" dirty="0">
                 <a:solidFill>
                   <a:schemeClr val="tx1"/>
                 </a:solidFill>
@@ -7709,7 +7693,7 @@
               <a:t>To calculate Bray-Curtis, let’s first calculate </a:t>
             </a:r>
             <a:r>
-              <a:rPr lang="en-US" sz="1200" b="0" i="0" kern="1200" dirty="0" err="1" smtClean="0">
+              <a:rPr lang="en-US" sz="1200" b="0" i="0" kern="1200" dirty="0" err="1">
                 <a:solidFill>
                   <a:schemeClr val="tx1"/>
                 </a:solidFill>
@@ -7721,7 +7705,7 @@
               <a:t>C</a:t>
             </a:r>
             <a:r>
-              <a:rPr lang="en-US" sz="1200" b="0" i="0" kern="1200" baseline="-25000" dirty="0" err="1" smtClean="0">
+              <a:rPr lang="en-US" sz="1200" b="0" i="0" kern="1200" baseline="-25000" dirty="0" err="1">
                 <a:solidFill>
                   <a:schemeClr val="tx1"/>
                 </a:solidFill>
@@ -7733,7 +7717,7 @@
               <a:t>ij</a:t>
             </a:r>
             <a:r>
-              <a:rPr lang="en-US" sz="1200" b="0" i="0" kern="1200" dirty="0" smtClean="0">
+              <a:rPr lang="en-US" sz="1200" b="0" i="0" kern="1200" dirty="0">
                 <a:solidFill>
                   <a:schemeClr val="tx1"/>
                 </a:solidFill>
@@ -7745,7 +7729,7 @@
               <a:t> (the sum of only the lesser counts for each species found in both sites). Goldfish are found on both sites; the lesser count is 6. Guppies are only on one site, so they can’t be added in here. Rainbow fish, though, are on both, and the lesser count is 4.</a:t>
             </a:r>
             <a:br>
-              <a:rPr lang="en-US" sz="1200" b="0" i="0" kern="1200" dirty="0" smtClean="0">
+              <a:rPr lang="en-US" sz="1200" b="0" i="0" kern="1200" dirty="0">
                 <a:solidFill>
                   <a:schemeClr val="tx1"/>
                 </a:solidFill>
@@ -7756,7 +7740,7 @@
               </a:rPr>
             </a:br>
             <a:r>
-              <a:rPr lang="en-US" sz="1200" b="0" i="0" kern="1200" dirty="0" smtClean="0">
+              <a:rPr lang="en-US" sz="1200" b="0" i="0" kern="1200" dirty="0">
                 <a:solidFill>
                   <a:schemeClr val="tx1"/>
                 </a:solidFill>
@@ -7768,7 +7752,7 @@
               <a:t>So </a:t>
             </a:r>
             <a:r>
-              <a:rPr lang="en-US" sz="1200" b="0" i="0" kern="1200" dirty="0" err="1" smtClean="0">
+              <a:rPr lang="en-US" sz="1200" b="0" i="0" kern="1200" dirty="0" err="1">
                 <a:solidFill>
                   <a:schemeClr val="tx1"/>
                 </a:solidFill>
@@ -7780,7 +7764,7 @@
               <a:t>C</a:t>
             </a:r>
             <a:r>
-              <a:rPr lang="en-US" sz="1200" b="0" i="0" kern="1200" baseline="-25000" dirty="0" err="1" smtClean="0">
+              <a:rPr lang="en-US" sz="1200" b="0" i="0" kern="1200" baseline="-25000" dirty="0" err="1">
                 <a:solidFill>
                   <a:schemeClr val="tx1"/>
                 </a:solidFill>
@@ -7792,7 +7776,7 @@
               <a:t>ij</a:t>
             </a:r>
             <a:r>
-              <a:rPr lang="en-US" sz="1200" b="0" i="0" kern="1200" dirty="0" smtClean="0">
+              <a:rPr lang="en-US" sz="1200" b="0" i="0" kern="1200" dirty="0">
                 <a:solidFill>
                   <a:schemeClr val="tx1"/>
                 </a:solidFill>
@@ -7807,7 +7791,7 @@
           <a:p>
             <a:pPr fontAlgn="base"/>
             <a:r>
-              <a:rPr lang="en-US" sz="1200" b="0" i="0" kern="1200" dirty="0" smtClean="0">
+              <a:rPr lang="en-US" sz="1200" b="0" i="0" kern="1200" dirty="0">
                 <a:solidFill>
                   <a:schemeClr val="tx1"/>
                 </a:solidFill>
@@ -7819,7 +7803,7 @@
               <a:t>S</a:t>
             </a:r>
             <a:r>
-              <a:rPr lang="en-US" sz="1200" b="0" i="0" kern="1200" baseline="-25000" dirty="0" smtClean="0">
+              <a:rPr lang="en-US" sz="1200" b="0" i="0" kern="1200" baseline="-25000" dirty="0">
                 <a:solidFill>
                   <a:schemeClr val="tx1"/>
                 </a:solidFill>
@@ -7831,7 +7815,7 @@
               <a:t>i</a:t>
             </a:r>
             <a:r>
-              <a:rPr lang="en-US" sz="1200" b="0" i="0" kern="1200" dirty="0" smtClean="0">
+              <a:rPr lang="en-US" sz="1200" b="0" i="0" kern="1200" dirty="0">
                 <a:solidFill>
                   <a:schemeClr val="tx1"/>
                 </a:solidFill>
@@ -7843,7 +7827,7 @@
               <a:t> ( total number of specimens counted on site i) = 6 + 7 + 4 = 17, and</a:t>
             </a:r>
             <a:br>
-              <a:rPr lang="en-US" sz="1200" b="0" i="0" kern="1200" dirty="0" smtClean="0">
+              <a:rPr lang="en-US" sz="1200" b="0" i="0" kern="1200" dirty="0">
                 <a:solidFill>
                   <a:schemeClr val="tx1"/>
                 </a:solidFill>
@@ -7854,7 +7838,7 @@
               </a:rPr>
             </a:br>
             <a:r>
-              <a:rPr lang="en-US" sz="1200" b="0" i="0" kern="1200" dirty="0" err="1" smtClean="0">
+              <a:rPr lang="en-US" sz="1200" b="0" i="0" kern="1200" dirty="0" err="1">
                 <a:solidFill>
                   <a:schemeClr val="tx1"/>
                 </a:solidFill>
@@ -7866,7 +7850,7 @@
               <a:t>S</a:t>
             </a:r>
             <a:r>
-              <a:rPr lang="en-US" sz="1200" b="0" i="0" kern="1200" baseline="-25000" dirty="0" err="1" smtClean="0">
+              <a:rPr lang="en-US" sz="1200" b="0" i="0" kern="1200" baseline="-25000" dirty="0" err="1">
                 <a:solidFill>
                   <a:schemeClr val="tx1"/>
                 </a:solidFill>
@@ -7878,7 +7862,7 @@
               <a:t>j</a:t>
             </a:r>
             <a:r>
-              <a:rPr lang="en-US" sz="1200" b="0" i="0" kern="1200" dirty="0" smtClean="0">
+              <a:rPr lang="en-US" sz="1200" b="0" i="0" kern="1200" dirty="0">
                 <a:solidFill>
                   <a:schemeClr val="tx1"/>
                 </a:solidFill>
@@ -7893,7 +7877,7 @@
           <a:p>
             <a:pPr fontAlgn="base"/>
             <a:r>
-              <a:rPr lang="en-US" sz="1200" b="0" i="0" kern="1200" dirty="0" smtClean="0">
+              <a:rPr lang="en-US" sz="1200" b="0" i="0" kern="1200" dirty="0">
                 <a:solidFill>
                   <a:schemeClr val="tx1"/>
                 </a:solidFill>
@@ -7905,7 +7889,7 @@
               <a:t>So our </a:t>
             </a:r>
             <a:r>
-              <a:rPr lang="en-US" sz="1200" b="0" i="0" kern="1200" dirty="0" err="1" smtClean="0">
+              <a:rPr lang="en-US" sz="1200" b="0" i="0" kern="1200" dirty="0" err="1">
                 <a:solidFill>
                   <a:schemeClr val="tx1"/>
                 </a:solidFill>
@@ -7917,7 +7901,7 @@
               <a:t>BC</a:t>
             </a:r>
             <a:r>
-              <a:rPr lang="en-US" sz="1200" b="0" i="0" kern="1200" baseline="-25000" dirty="0" err="1" smtClean="0">
+              <a:rPr lang="en-US" sz="1200" b="0" i="0" kern="1200" baseline="-25000" dirty="0" err="1">
                 <a:solidFill>
                   <a:schemeClr val="tx1"/>
                 </a:solidFill>
@@ -7929,7 +7913,7 @@
               <a:t>ij</a:t>
             </a:r>
             <a:r>
-              <a:rPr lang="en-US" sz="1200" b="0" i="0" kern="1200" dirty="0" smtClean="0">
+              <a:rPr lang="en-US" sz="1200" b="0" i="0" kern="1200" dirty="0">
                 <a:solidFill>
                   <a:schemeClr val="tx1"/>
                 </a:solidFill>
@@ -8070,7 +8054,7 @@
                 </a:solidFill>
               </a:rPr>
               <a:pPr/>
-              <a:t>7/5/2019</a:t>
+              <a:t>7/15/2019</a:t>
             </a:fld>
             <a:endParaRPr lang="en-US">
               <a:solidFill>
@@ -8277,7 +8261,7 @@
                 </a:solidFill>
               </a:rPr>
               <a:pPr/>
-              <a:t>7/5/2019</a:t>
+              <a:t>7/15/2019</a:t>
             </a:fld>
             <a:endParaRPr lang="en-US">
               <a:solidFill>
@@ -8584,7 +8568,7 @@
                 </a:solidFill>
               </a:rPr>
               <a:pPr/>
-              <a:t>7/5/2019</a:t>
+              <a:t>7/15/2019</a:t>
             </a:fld>
             <a:endParaRPr lang="en-US">
               <a:solidFill>
@@ -8868,7 +8852,7 @@
                 </a:solidFill>
               </a:rPr>
               <a:pPr/>
-              <a:t>7/5/2019</a:t>
+              <a:t>7/15/2019</a:t>
             </a:fld>
             <a:endParaRPr lang="en-US">
               <a:solidFill>
@@ -9068,7 +9052,7 @@
                 </a:solidFill>
               </a:rPr>
               <a:pPr/>
-              <a:t>7/5/2019</a:t>
+              <a:t>7/15/2019</a:t>
             </a:fld>
             <a:endParaRPr lang="en-US">
               <a:solidFill>
@@ -9278,7 +9262,7 @@
                 </a:solidFill>
               </a:rPr>
               <a:pPr/>
-              <a:t>7/5/2019</a:t>
+              <a:t>7/15/2019</a:t>
             </a:fld>
             <a:endParaRPr lang="en-US">
               <a:solidFill>
@@ -9500,7 +9484,7 @@
                 </a:solidFill>
               </a:rPr>
               <a:pPr/>
-              <a:t>7/5/2019</a:t>
+              <a:t>7/15/2019</a:t>
             </a:fld>
             <a:endParaRPr lang="en-US">
               <a:solidFill>
@@ -9700,7 +9684,7 @@
                 </a:solidFill>
               </a:rPr>
               <a:pPr/>
-              <a:t>7/5/2019</a:t>
+              <a:t>7/15/2019</a:t>
             </a:fld>
             <a:endParaRPr lang="en-US">
               <a:solidFill>
@@ -9977,7 +9961,7 @@
                 </a:solidFill>
               </a:rPr>
               <a:pPr/>
-              <a:t>7/5/2019</a:t>
+              <a:t>7/15/2019</a:t>
             </a:fld>
             <a:endParaRPr lang="en-US">
               <a:solidFill>
@@ -10238,7 +10222,7 @@
                 </a:solidFill>
               </a:rPr>
               <a:pPr/>
-              <a:t>7/5/2019</a:t>
+              <a:t>7/15/2019</a:t>
             </a:fld>
             <a:endParaRPr lang="en-US">
               <a:solidFill>
@@ -10634,7 +10618,7 @@
                 </a:solidFill>
               </a:rPr>
               <a:pPr/>
-              <a:t>7/5/2019</a:t>
+              <a:t>7/15/2019</a:t>
             </a:fld>
             <a:endParaRPr lang="en-US">
               <a:solidFill>
@@ -10848,7 +10832,7 @@
                 </a:solidFill>
               </a:rPr>
               <a:pPr/>
-              <a:t>7/5/2019</a:t>
+              <a:t>7/15/2019</a:t>
             </a:fld>
             <a:endParaRPr lang="en-US">
               <a:solidFill>
@@ -10961,7 +10945,7 @@
                 </a:solidFill>
               </a:rPr>
               <a:pPr/>
-              <a:t>7/5/2019</a:t>
+              <a:t>7/15/2019</a:t>
             </a:fld>
             <a:endParaRPr lang="en-US">
               <a:solidFill>
@@ -11088,7 +11072,7 @@
                 </a:solidFill>
               </a:rPr>
               <a:pPr/>
-              <a:t>7/5/2019</a:t>
+              <a:t>7/15/2019</a:t>
             </a:fld>
             <a:endParaRPr lang="en-US">
               <a:solidFill>
@@ -11395,7 +11379,7 @@
                 </a:solidFill>
               </a:rPr>
               <a:pPr/>
-              <a:t>7/5/2019</a:t>
+              <a:t>7/15/2019</a:t>
             </a:fld>
             <a:endParaRPr lang="en-US">
               <a:solidFill>
@@ -11679,7 +11663,7 @@
                 </a:solidFill>
               </a:rPr>
               <a:pPr/>
-              <a:t>7/5/2019</a:t>
+              <a:t>7/15/2019</a:t>
             </a:fld>
             <a:endParaRPr lang="en-US">
               <a:solidFill>
@@ -11879,7 +11863,7 @@
                 </a:solidFill>
               </a:rPr>
               <a:pPr/>
-              <a:t>7/5/2019</a:t>
+              <a:t>7/15/2019</a:t>
             </a:fld>
             <a:endParaRPr lang="en-US">
               <a:solidFill>
@@ -12089,7 +12073,7 @@
                 </a:solidFill>
               </a:rPr>
               <a:pPr/>
-              <a:t>7/5/2019</a:t>
+              <a:t>7/15/2019</a:t>
             </a:fld>
             <a:endParaRPr lang="en-US">
               <a:solidFill>
@@ -12311,7 +12295,7 @@
                 </a:solidFill>
               </a:rPr>
               <a:pPr/>
-              <a:t>7/5/2019</a:t>
+              <a:t>7/15/2019</a:t>
             </a:fld>
             <a:endParaRPr lang="en-US">
               <a:solidFill>
@@ -12511,7 +12495,7 @@
                 </a:solidFill>
               </a:rPr>
               <a:pPr/>
-              <a:t>7/5/2019</a:t>
+              <a:t>7/15/2019</a:t>
             </a:fld>
             <a:endParaRPr lang="en-US">
               <a:solidFill>
@@ -12788,7 +12772,7 @@
                 </a:solidFill>
               </a:rPr>
               <a:pPr/>
-              <a:t>7/5/2019</a:t>
+              <a:t>7/15/2019</a:t>
             </a:fld>
             <a:endParaRPr lang="en-US">
               <a:solidFill>
@@ -13049,7 +13033,7 @@
                 </a:solidFill>
               </a:rPr>
               <a:pPr/>
-              <a:t>7/5/2019</a:t>
+              <a:t>7/15/2019</a:t>
             </a:fld>
             <a:endParaRPr lang="en-US">
               <a:solidFill>
@@ -13380,7 +13364,7 @@
                 </a:solidFill>
               </a:rPr>
               <a:pPr/>
-              <a:t>7/5/2019</a:t>
+              <a:t>7/15/2019</a:t>
             </a:fld>
             <a:endParaRPr lang="en-US">
               <a:solidFill>
@@ -13740,7 +13724,7 @@
                 </a:solidFill>
               </a:rPr>
               <a:pPr/>
-              <a:t>7/5/2019</a:t>
+              <a:t>7/15/2019</a:t>
             </a:fld>
             <a:endParaRPr lang="en-US">
               <a:solidFill>
@@ -13889,7 +13873,7 @@
                 </a:solidFill>
               </a:rPr>
               <a:pPr/>
-              <a:t>7/5/2019</a:t>
+              <a:t>7/15/2019</a:t>
             </a:fld>
             <a:endParaRPr lang="en-US">
               <a:solidFill>
@@ -14016,7 +14000,7 @@
                 </a:solidFill>
               </a:rPr>
               <a:pPr/>
-              <a:t>7/5/2019</a:t>
+              <a:t>7/15/2019</a:t>
             </a:fld>
             <a:endParaRPr lang="en-US">
               <a:solidFill>
@@ -14323,7 +14307,7 @@
                 </a:solidFill>
               </a:rPr>
               <a:pPr/>
-              <a:t>7/5/2019</a:t>
+              <a:t>7/15/2019</a:t>
             </a:fld>
             <a:endParaRPr lang="en-US">
               <a:solidFill>
@@ -14607,7 +14591,7 @@
                 </a:solidFill>
               </a:rPr>
               <a:pPr/>
-              <a:t>7/5/2019</a:t>
+              <a:t>7/15/2019</a:t>
             </a:fld>
             <a:endParaRPr lang="en-US">
               <a:solidFill>
@@ -14807,7 +14791,7 @@
                 </a:solidFill>
               </a:rPr>
               <a:pPr/>
-              <a:t>7/5/2019</a:t>
+              <a:t>7/15/2019</a:t>
             </a:fld>
             <a:endParaRPr lang="en-US">
               <a:solidFill>
@@ -15017,7 +15001,7 @@
                 </a:solidFill>
               </a:rPr>
               <a:pPr/>
-              <a:t>7/5/2019</a:t>
+              <a:t>7/15/2019</a:t>
             </a:fld>
             <a:endParaRPr lang="en-US">
               <a:solidFill>
@@ -15239,7 +15223,7 @@
                 </a:solidFill>
               </a:rPr>
               <a:pPr/>
-              <a:t>7/5/2019</a:t>
+              <a:t>7/15/2019</a:t>
             </a:fld>
             <a:endParaRPr lang="en-US">
               <a:solidFill>
@@ -15439,7 +15423,7 @@
                 </a:solidFill>
               </a:rPr>
               <a:pPr/>
-              <a:t>7/5/2019</a:t>
+              <a:t>7/15/2019</a:t>
             </a:fld>
             <a:endParaRPr lang="en-US">
               <a:solidFill>
@@ -15716,7 +15700,7 @@
                 </a:solidFill>
               </a:rPr>
               <a:pPr/>
-              <a:t>7/5/2019</a:t>
+              <a:t>7/15/2019</a:t>
             </a:fld>
             <a:endParaRPr lang="en-US">
               <a:solidFill>
@@ -15977,7 +15961,7 @@
                 </a:solidFill>
               </a:rPr>
               <a:pPr/>
-              <a:t>7/5/2019</a:t>
+              <a:t>7/15/2019</a:t>
             </a:fld>
             <a:endParaRPr lang="en-US">
               <a:solidFill>
@@ -16373,7 +16357,7 @@
                 </a:solidFill>
               </a:rPr>
               <a:pPr/>
-              <a:t>7/5/2019</a:t>
+              <a:t>7/15/2019</a:t>
             </a:fld>
             <a:endParaRPr lang="en-US">
               <a:solidFill>
@@ -16522,7 +16506,7 @@
                 </a:solidFill>
               </a:rPr>
               <a:pPr/>
-              <a:t>7/5/2019</a:t>
+              <a:t>7/15/2019</a:t>
             </a:fld>
             <a:endParaRPr lang="en-US">
               <a:solidFill>
@@ -16777,7 +16761,7 @@
                 </a:solidFill>
               </a:rPr>
               <a:pPr/>
-              <a:t>7/5/2019</a:t>
+              <a:t>7/15/2019</a:t>
             </a:fld>
             <a:endParaRPr lang="en-US">
               <a:solidFill>
@@ -17258,7 +17242,7 @@
                 </a:solidFill>
               </a:rPr>
               <a:pPr/>
-              <a:t>7/5/2019</a:t>
+              <a:t>7/15/2019</a:t>
             </a:fld>
             <a:endParaRPr lang="en-US">
               <a:solidFill>
@@ -17828,7 +17812,7 @@
                 </a:solidFill>
               </a:rPr>
               <a:pPr/>
-              <a:t>7/5/2019</a:t>
+              <a:t>7/15/2019</a:t>
             </a:fld>
             <a:endParaRPr lang="en-US">
               <a:solidFill>
@@ -18398,7 +18382,7 @@
                 </a:solidFill>
               </a:rPr>
               <a:pPr/>
-              <a:t>7/5/2019</a:t>
+              <a:t>7/15/2019</a:t>
             </a:fld>
             <a:endParaRPr lang="en-US">
               <a:solidFill>
@@ -18852,7 +18836,7 @@
           <a:p>
             <a:pPr algn="ctr"/>
             <a:r>
-              <a:rPr lang="en-US" sz="4800" dirty="0" smtClean="0">
+              <a:rPr lang="en-US" sz="4800" dirty="0">
                 <a:solidFill>
                   <a:schemeClr val="tx1">
                     <a:lumMod val="50000"/>
@@ -18861,13 +18845,6 @@
               </a:rPr>
               <a:t>Introduction to Microbiome Data Analysis</a:t>
             </a:r>
-            <a:endParaRPr lang="en-US" sz="4800" dirty="0">
-              <a:solidFill>
-                <a:schemeClr val="tx1">
-                  <a:lumMod val="50000"/>
-                </a:schemeClr>
-              </a:solidFill>
-            </a:endParaRPr>
           </a:p>
         </p:txBody>
       </p:sp>
@@ -19038,142 +19015,9 @@
           <a:p>
             <a:pPr algn="ctr"/>
             <a:r>
-              <a:rPr lang="en-US" dirty="0" smtClean="0"/>
-              <a:t>Differential Abundance Testing</a:t>
-            </a:r>
-            <a:endParaRPr lang="en-US" dirty="0"/>
-          </a:p>
-        </p:txBody>
-      </p:sp>
-      <p:sp>
-        <p:nvSpPr>
-          <p:cNvPr id="3" name="Content Placeholder 2"/>
-          <p:cNvSpPr>
-            <a:spLocks noGrp="1"/>
-          </p:cNvSpPr>
-          <p:nvPr>
-            <p:ph idx="1"/>
-          </p:nvPr>
-        </p:nvSpPr>
-        <p:spPr/>
-        <p:txBody>
-          <a:bodyPr>
-            <a:normAutofit lnSpcReduction="10000"/>
-          </a:bodyPr>
-          <a:lstStyle/>
-          <a:p>
-            <a:r>
-              <a:rPr lang="en-US" dirty="0" smtClean="0"/>
-              <a:t>Common goal of many microbiome studies is to identify specific taxa associated with outcome of interest</a:t>
-            </a:r>
-          </a:p>
-          <a:p>
-            <a:endParaRPr lang="en-US" sz="1200" dirty="0" smtClean="0"/>
-          </a:p>
-          <a:p>
-            <a:r>
-              <a:rPr lang="en-US" dirty="0" smtClean="0"/>
-              <a:t>Typically performed by testing features one-by-one and applying a false discovery rate correction to control the overall type I error rate</a:t>
-            </a:r>
-          </a:p>
-          <a:p>
-            <a:endParaRPr lang="en-US" sz="1200" dirty="0"/>
-          </a:p>
-          <a:p>
-            <a:r>
               <a:rPr lang="en-US" dirty="0"/>
-              <a:t>M</a:t>
-            </a:r>
-            <a:r>
-              <a:rPr lang="en-US" dirty="0" smtClean="0"/>
-              <a:t>any challenges associated with attempting to identify specific taxa associated with an outcome</a:t>
-            </a:r>
-          </a:p>
-          <a:p>
-            <a:endParaRPr lang="en-US" sz="1200" dirty="0" smtClean="0"/>
-          </a:p>
-          <a:p>
-            <a:r>
-              <a:rPr lang="en-US" dirty="0" smtClean="0"/>
-              <a:t>LOTS OF WAYS to do perform these tests</a:t>
-            </a:r>
-          </a:p>
-          <a:p>
-            <a:pPr lvl="1"/>
-            <a:r>
-              <a:rPr lang="en-US" dirty="0" smtClean="0"/>
-              <a:t>Not clear which approach best for given </a:t>
-            </a:r>
-            <a:r>
-              <a:rPr lang="en-US" dirty="0" err="1" smtClean="0"/>
-              <a:t>situtation</a:t>
-            </a:r>
-            <a:r>
-              <a:rPr lang="en-US" dirty="0" smtClean="0"/>
-              <a:t> </a:t>
-            </a:r>
-            <a:endParaRPr lang="en-US" dirty="0"/>
-          </a:p>
-        </p:txBody>
-      </p:sp>
-    </p:spTree>
-    <p:extLst>
-      <p:ext uri="{BB962C8B-B14F-4D97-AF65-F5344CB8AC3E}">
-        <p14:creationId xmlns:p14="http://schemas.microsoft.com/office/powerpoint/2010/main" val="2748057577"/>
-      </p:ext>
-    </p:extLst>
-  </p:cSld>
-  <p:clrMapOvr>
-    <a:masterClrMapping/>
-  </p:clrMapOvr>
-  <p:timing>
-    <p:tnLst>
-      <p:par>
-        <p:cTn id="1" dur="indefinite" restart="never" nodeType="tmRoot"/>
-      </p:par>
-    </p:tnLst>
-  </p:timing>
-</p:sld>
-</file>
-
-<file path=ppt/slides/slide11.xml><?xml version="1.0" encoding="utf-8"?>
-<p:sld xmlns:a="http://schemas.openxmlformats.org/drawingml/2006/main" xmlns:r="http://schemas.openxmlformats.org/officeDocument/2006/relationships" xmlns:p="http://schemas.openxmlformats.org/presentationml/2006/main">
-  <p:cSld>
-    <p:spTree>
-      <p:nvGrpSpPr>
-        <p:cNvPr id="1" name=""/>
-        <p:cNvGrpSpPr/>
-        <p:nvPr/>
-      </p:nvGrpSpPr>
-      <p:grpSpPr>
-        <a:xfrm>
-          <a:off x="0" y="0"/>
-          <a:ext cx="0" cy="0"/>
-          <a:chOff x="0" y="0"/>
-          <a:chExt cx="0" cy="0"/>
-        </a:xfrm>
-      </p:grpSpPr>
-      <p:sp>
-        <p:nvSpPr>
-          <p:cNvPr id="2" name="Title 1"/>
-          <p:cNvSpPr>
-            <a:spLocks noGrp="1"/>
-          </p:cNvSpPr>
-          <p:nvPr>
-            <p:ph type="title"/>
-          </p:nvPr>
-        </p:nvSpPr>
-        <p:spPr/>
-        <p:txBody>
-          <a:bodyPr/>
-          <a:lstStyle/>
-          <a:p>
-            <a:pPr algn="ctr"/>
-            <a:r>
-              <a:rPr lang="en-US" dirty="0" smtClean="0"/>
               <a:t>Introduction to Microbiome Analysis Tutorial</a:t>
             </a:r>
-            <a:endParaRPr lang="en-US" dirty="0"/>
           </a:p>
         </p:txBody>
       </p:sp>
@@ -19224,12 +19068,12 @@
           <a:lstStyle/>
           <a:p>
             <a:r>
-              <a:rPr lang="en-US" dirty="0" smtClean="0">
+              <a:rPr lang="en-US" dirty="0">
                 <a:hlinkClick r:id="rId3"/>
               </a:rPr>
               <a:t>https://github.com/Nick243/Introduction-to-Metagenomics-Summer-Workshop-2019</a:t>
             </a:r>
-            <a:endParaRPr lang="en-US" dirty="0" smtClean="0"/>
+            <a:endParaRPr lang="en-US" dirty="0"/>
           </a:p>
           <a:p>
             <a:endParaRPr lang="en-US" dirty="0"/>
@@ -19273,6 +19117,170 @@
           <a:chExt cx="0" cy="0"/>
         </a:xfrm>
       </p:grpSpPr>
+      <p:graphicFrame>
+        <p:nvGraphicFramePr>
+          <p:cNvPr id="2" name="Diagram 1"/>
+          <p:cNvGraphicFramePr/>
+          <p:nvPr/>
+        </p:nvGraphicFramePr>
+        <p:xfrm>
+          <a:off x="644652" y="1690688"/>
+          <a:ext cx="10552175" cy="2304288"/>
+        </p:xfrm>
+        <a:graphic>
+          <a:graphicData uri="http://schemas.openxmlformats.org/drawingml/2006/diagram">
+            <dgm:relIds xmlns:dgm="http://schemas.openxmlformats.org/drawingml/2006/diagram" xmlns:r="http://schemas.openxmlformats.org/officeDocument/2006/relationships" r:dm="rId2" r:lo="rId3" r:qs="rId4" r:cs="rId5"/>
+          </a:graphicData>
+        </a:graphic>
+      </p:graphicFrame>
+      <p:sp>
+        <p:nvSpPr>
+          <p:cNvPr id="3" name="Title 2"/>
+          <p:cNvSpPr>
+            <a:spLocks noGrp="1"/>
+          </p:cNvSpPr>
+          <p:nvPr>
+            <p:ph type="title"/>
+          </p:nvPr>
+        </p:nvSpPr>
+        <p:spPr/>
+        <p:txBody>
+          <a:bodyPr>
+            <a:normAutofit/>
+          </a:bodyPr>
+          <a:lstStyle/>
+          <a:p>
+            <a:pPr algn="ctr"/>
+            <a:r>
+              <a:rPr lang="en-US" dirty="0"/>
+              <a:t>Conceptual Model of a </a:t>
+            </a:r>
+            <a:br>
+              <a:rPr lang="en-US" dirty="0"/>
+            </a:br>
+            <a:r>
+              <a:rPr lang="en-US" dirty="0"/>
+              <a:t>Microbiome Research Project</a:t>
+            </a:r>
+          </a:p>
+        </p:txBody>
+      </p:sp>
+      <p:sp>
+        <p:nvSpPr>
+          <p:cNvPr id="5" name="Content Placeholder 4"/>
+          <p:cNvSpPr>
+            <a:spLocks noGrp="1"/>
+          </p:cNvSpPr>
+          <p:nvPr>
+            <p:ph idx="1"/>
+          </p:nvPr>
+        </p:nvSpPr>
+        <p:spPr>
+          <a:xfrm>
+            <a:off x="838200" y="4345115"/>
+            <a:ext cx="10515600" cy="2083117"/>
+          </a:xfrm>
+        </p:spPr>
+        <p:txBody>
+          <a:bodyPr>
+            <a:normAutofit/>
+          </a:bodyPr>
+          <a:lstStyle/>
+          <a:p>
+            <a:r>
+              <a:rPr lang="en-US" dirty="0">
+                <a:solidFill>
+                  <a:schemeClr val="bg2">
+                    <a:lumMod val="50000"/>
+                  </a:schemeClr>
+                </a:solidFill>
+              </a:rPr>
+              <a:t>The “analysis” of microbiome data occurs in 2 steps:</a:t>
+            </a:r>
+          </a:p>
+          <a:p>
+            <a:pPr lvl="1"/>
+            <a:r>
+              <a:rPr lang="en-US" b="1" dirty="0">
+                <a:solidFill>
+                  <a:schemeClr val="bg2">
+                    <a:lumMod val="50000"/>
+                  </a:schemeClr>
+                </a:solidFill>
+              </a:rPr>
+              <a:t>Step 1:</a:t>
+            </a:r>
+            <a:r>
+              <a:rPr lang="en-US" dirty="0">
+                <a:solidFill>
+                  <a:schemeClr val="bg2">
+                    <a:lumMod val="50000"/>
+                  </a:schemeClr>
+                </a:solidFill>
+              </a:rPr>
+              <a:t> processing the raw sequence data into form amenable for statistical analysis </a:t>
+            </a:r>
+            <a:r>
+              <a:rPr lang="en-US" sz="1800" dirty="0">
+                <a:solidFill>
+                  <a:schemeClr val="bg2">
+                    <a:lumMod val="50000"/>
+                  </a:schemeClr>
+                </a:solidFill>
+              </a:rPr>
+              <a:t>(i.e. taxa by sample count matrix)</a:t>
+            </a:r>
+          </a:p>
+          <a:p>
+            <a:pPr lvl="1"/>
+            <a:r>
+              <a:rPr lang="en-US" b="1" dirty="0"/>
+              <a:t>Step 2:</a:t>
+            </a:r>
+            <a:r>
+              <a:rPr lang="en-US" dirty="0"/>
+              <a:t> correlating microbial features with outcomes of interest</a:t>
+            </a:r>
+          </a:p>
+        </p:txBody>
+      </p:sp>
+    </p:spTree>
+    <p:extLst>
+      <p:ext uri="{BB962C8B-B14F-4D97-AF65-F5344CB8AC3E}">
+        <p14:creationId xmlns:p14="http://schemas.microsoft.com/office/powerpoint/2010/main" val="3531814522"/>
+      </p:ext>
+    </p:extLst>
+  </p:cSld>
+  <p:clrMapOvr>
+    <a:masterClrMapping/>
+  </p:clrMapOvr>
+  <p:timing>
+    <p:tnLst>
+      <p:par>
+        <p:cTn id="1" dur="indefinite" restart="never" nodeType="tmRoot"/>
+      </p:par>
+    </p:tnLst>
+  </p:timing>
+</p:sld>
+</file>
+
+<file path=ppt/slides/slide3.xml><?xml version="1.0" encoding="utf-8"?>
+<p:sld xmlns:a="http://schemas.openxmlformats.org/drawingml/2006/main" xmlns:r="http://schemas.openxmlformats.org/officeDocument/2006/relationships" xmlns:p="http://schemas.openxmlformats.org/presentationml/2006/main">
+  <p:cSld>
+    <p:spTree>
+      <p:nvGrpSpPr>
+        <p:cNvPr id="1" name=""/>
+        <p:cNvGrpSpPr/>
+        <p:nvPr/>
+      </p:nvGrpSpPr>
+      <p:grpSpPr>
+        <a:xfrm>
+          <a:off x="0" y="0"/>
+          <a:ext cx="0" cy="0"/>
+          <a:chOff x="0" y="0"/>
+          <a:chExt cx="0" cy="0"/>
+        </a:xfrm>
+      </p:grpSpPr>
       <p:sp>
         <p:nvSpPr>
           <p:cNvPr id="2" name="Title 1"/>
@@ -19328,68 +19336,23 @@
             </a:r>
             <a:r>
               <a:rPr lang="en-US" dirty="0"/>
-              <a:t> introduction </a:t>
-            </a:r>
+              <a:t> introduction to methods used in the statistical analysis of microbiome data </a:t>
+            </a:r>
+          </a:p>
+          <a:p>
+            <a:pPr lvl="1"/>
+            <a:r>
+              <a:rPr lang="en-US" dirty="0"/>
+              <a:t>Challenging features of microbiome data</a:t>
+            </a:r>
+          </a:p>
+          <a:p>
+            <a:pPr lvl="1"/>
             <a:r>
               <a:rPr lang="en-US" dirty="0" smtClean="0"/>
-              <a:t>to </a:t>
-            </a:r>
-            <a:r>
-              <a:rPr lang="en-US" dirty="0" smtClean="0"/>
-              <a:t>methods </a:t>
-            </a:r>
-            <a:r>
-              <a:rPr lang="en-US" dirty="0" smtClean="0"/>
-              <a:t>used </a:t>
-            </a:r>
-            <a:r>
-              <a:rPr lang="en-US" dirty="0" smtClean="0"/>
-              <a:t>in the statistical analysis of</a:t>
-            </a:r>
-            <a:r>
-              <a:rPr lang="en-US" dirty="0" smtClean="0"/>
-              <a:t> </a:t>
-            </a:r>
-            <a:r>
-              <a:rPr lang="en-US" dirty="0" smtClean="0"/>
-              <a:t>microbiome data </a:t>
+              <a:t>Present a few common alpha- and beta-diversity estimators </a:t>
             </a:r>
             <a:endParaRPr lang="en-US" dirty="0"/>
-          </a:p>
-          <a:p>
-            <a:pPr lvl="1"/>
-            <a:r>
-              <a:rPr lang="en-US" dirty="0" smtClean="0"/>
-              <a:t>Challenging f</a:t>
-            </a:r>
-            <a:r>
-              <a:rPr lang="en-US" dirty="0" smtClean="0"/>
-              <a:t>eatures </a:t>
-            </a:r>
-            <a:r>
-              <a:rPr lang="en-US" dirty="0" smtClean="0"/>
-              <a:t>of microbiome </a:t>
-            </a:r>
-            <a:r>
-              <a:rPr lang="en-US" dirty="0" smtClean="0"/>
-              <a:t>data</a:t>
-            </a:r>
-            <a:endParaRPr lang="en-US" dirty="0"/>
-          </a:p>
-          <a:p>
-            <a:pPr lvl="1"/>
-            <a:r>
-              <a:rPr lang="en-US" dirty="0" smtClean="0"/>
-              <a:t>Introduce a few</a:t>
-            </a:r>
-            <a:r>
-              <a:rPr lang="en-US" dirty="0" smtClean="0"/>
-              <a:t> </a:t>
-            </a:r>
-            <a:r>
-              <a:rPr lang="en-US" dirty="0" smtClean="0"/>
-              <a:t>common approaches</a:t>
-            </a:r>
           </a:p>
           <a:p>
             <a:pPr marL="457200" lvl="1" indent="0">
@@ -19400,29 +19363,16 @@
           <a:p>
             <a:r>
               <a:rPr lang="en-US" dirty="0"/>
-              <a:t>Work through </a:t>
-            </a:r>
-            <a:r>
-              <a:rPr lang="en-US" dirty="0" smtClean="0"/>
-              <a:t>the </a:t>
-            </a:r>
-            <a:r>
-              <a:rPr lang="en-US" b="1" dirty="0" smtClean="0"/>
-              <a:t>Introduction to the Statistical Analysis of </a:t>
-            </a:r>
-            <a:r>
-              <a:rPr lang="en-US" b="1" dirty="0" smtClean="0"/>
-              <a:t>Microbiome Data</a:t>
-            </a:r>
-            <a:r>
-              <a:rPr lang="en-US" dirty="0" smtClean="0"/>
-              <a:t> </a:t>
-            </a:r>
-            <a:r>
-              <a:rPr lang="en-US" dirty="0" smtClean="0"/>
-              <a:t>tutorial</a:t>
-            </a:r>
-            <a:endParaRPr lang="en-US" dirty="0"/>
+              <a:t>Work through the </a:t>
+            </a:r>
+            <a:r>
+              <a:rPr lang="en-US" b="1" dirty="0"/>
+              <a:t>Introduction to the Statistical Analysis of Microbiome Data</a:t>
+            </a:r>
+            <a:r>
+              <a:rPr lang="en-US" dirty="0"/>
+              <a:t> tutorial</a:t>
+            </a:r>
           </a:p>
           <a:p>
             <a:pPr lvl="1"/>
@@ -19432,19 +19382,19 @@
               </a:rPr>
               <a:t>https://github.com/Nick243/Introduction-to-Metagenomics-Summer-Workshop-2019</a:t>
             </a:r>
-            <a:endParaRPr lang="en-US" dirty="0" smtClean="0"/>
+            <a:endParaRPr lang="en-US" dirty="0"/>
           </a:p>
           <a:p>
             <a:pPr lvl="1"/>
             <a:r>
-              <a:rPr lang="en-US" dirty="0" smtClean="0"/>
+              <a:rPr lang="en-US" dirty="0"/>
               <a:t>Introduce you to some popular R packages</a:t>
             </a:r>
           </a:p>
           <a:p>
             <a:pPr lvl="1"/>
             <a:r>
-              <a:rPr lang="en-US" dirty="0" smtClean="0"/>
+              <a:rPr lang="en-US" dirty="0"/>
               <a:t>Work through some example analyses</a:t>
             </a:r>
           </a:p>
@@ -19470,7 +19420,7 @@
           <p:cNvPr id="4" name="Content Placeholder 3">
             <a:extLst>
               <a:ext uri="{FF2B5EF4-FFF2-40B4-BE49-F238E27FC236}">
-                <a16:creationId xmlns="" xmlns:a16="http://schemas.microsoft.com/office/drawing/2014/main" id="{002DDC9E-0FDC-994C-AC3A-EBEDB5435416}"/>
+                <a16:creationId xmlns:a16="http://schemas.microsoft.com/office/drawing/2014/main" xmlns="" id="{002DDC9E-0FDC-994C-AC3A-EBEDB5435416}"/>
               </a:ext>
             </a:extLst>
           </p:cNvPr>
@@ -19521,240 +19471,6 @@
 </p:sld>
 </file>
 
-<file path=ppt/slides/slide3.xml><?xml version="1.0" encoding="utf-8"?>
-<p:sld xmlns:a="http://schemas.openxmlformats.org/drawingml/2006/main" xmlns:r="http://schemas.openxmlformats.org/officeDocument/2006/relationships" xmlns:p="http://schemas.openxmlformats.org/presentationml/2006/main">
-  <p:cSld>
-    <p:spTree>
-      <p:nvGrpSpPr>
-        <p:cNvPr id="1" name=""/>
-        <p:cNvGrpSpPr/>
-        <p:nvPr/>
-      </p:nvGrpSpPr>
-      <p:grpSpPr>
-        <a:xfrm>
-          <a:off x="0" y="0"/>
-          <a:ext cx="0" cy="0"/>
-          <a:chOff x="0" y="0"/>
-          <a:chExt cx="0" cy="0"/>
-        </a:xfrm>
-      </p:grpSpPr>
-      <p:graphicFrame>
-        <p:nvGraphicFramePr>
-          <p:cNvPr id="2" name="Diagram 1"/>
-          <p:cNvGraphicFramePr/>
-          <p:nvPr>
-            <p:extLst/>
-          </p:nvPr>
-        </p:nvGraphicFramePr>
-        <p:xfrm>
-          <a:off x="644652" y="1690688"/>
-          <a:ext cx="10552175" cy="2304288"/>
-        </p:xfrm>
-        <a:graphic>
-          <a:graphicData uri="http://schemas.openxmlformats.org/drawingml/2006/diagram">
-            <dgm:relIds xmlns:dgm="http://schemas.openxmlformats.org/drawingml/2006/diagram" xmlns:r="http://schemas.openxmlformats.org/officeDocument/2006/relationships" r:dm="rId2" r:lo="rId3" r:qs="rId4" r:cs="rId5"/>
-          </a:graphicData>
-        </a:graphic>
-      </p:graphicFrame>
-      <p:sp>
-        <p:nvSpPr>
-          <p:cNvPr id="3" name="Title 2"/>
-          <p:cNvSpPr>
-            <a:spLocks noGrp="1"/>
-          </p:cNvSpPr>
-          <p:nvPr>
-            <p:ph type="title"/>
-          </p:nvPr>
-        </p:nvSpPr>
-        <p:spPr/>
-        <p:txBody>
-          <a:bodyPr>
-            <a:normAutofit/>
-          </a:bodyPr>
-          <a:lstStyle/>
-          <a:p>
-            <a:pPr algn="ctr"/>
-            <a:r>
-              <a:rPr lang="en-US" dirty="0"/>
-              <a:t>Conceptual Model of a </a:t>
-            </a:r>
-            <a:br>
-              <a:rPr lang="en-US" dirty="0"/>
-            </a:br>
-            <a:r>
-              <a:rPr lang="en-US" dirty="0"/>
-              <a:t>Microbiome Research Project</a:t>
-            </a:r>
-          </a:p>
-        </p:txBody>
-      </p:sp>
-      <p:sp>
-        <p:nvSpPr>
-          <p:cNvPr id="5" name="Content Placeholder 4"/>
-          <p:cNvSpPr>
-            <a:spLocks noGrp="1"/>
-          </p:cNvSpPr>
-          <p:nvPr>
-            <p:ph idx="1"/>
-          </p:nvPr>
-        </p:nvSpPr>
-        <p:spPr>
-          <a:xfrm>
-            <a:off x="838200" y="4345115"/>
-            <a:ext cx="10515600" cy="2083117"/>
-          </a:xfrm>
-        </p:spPr>
-        <p:txBody>
-          <a:bodyPr>
-            <a:normAutofit/>
-          </a:bodyPr>
-          <a:lstStyle/>
-          <a:p>
-            <a:r>
-              <a:rPr lang="en-US" dirty="0">
-                <a:solidFill>
-                  <a:schemeClr val="bg2">
-                    <a:lumMod val="50000"/>
-                  </a:schemeClr>
-                </a:solidFill>
-              </a:rPr>
-              <a:t>The “analysis” of </a:t>
-            </a:r>
-            <a:r>
-              <a:rPr lang="en-US" dirty="0" smtClean="0">
-                <a:solidFill>
-                  <a:schemeClr val="bg2">
-                    <a:lumMod val="50000"/>
-                  </a:schemeClr>
-                </a:solidFill>
-              </a:rPr>
-              <a:t>microbiome </a:t>
-            </a:r>
-            <a:r>
-              <a:rPr lang="en-US" dirty="0">
-                <a:solidFill>
-                  <a:schemeClr val="bg2">
-                    <a:lumMod val="50000"/>
-                  </a:schemeClr>
-                </a:solidFill>
-              </a:rPr>
-              <a:t>data occurs in 2 steps:</a:t>
-            </a:r>
-          </a:p>
-          <a:p>
-            <a:pPr lvl="1"/>
-            <a:r>
-              <a:rPr lang="en-US" b="1" dirty="0">
-                <a:solidFill>
-                  <a:schemeClr val="bg2">
-                    <a:lumMod val="50000"/>
-                  </a:schemeClr>
-                </a:solidFill>
-              </a:rPr>
-              <a:t>Step 1:</a:t>
-            </a:r>
-            <a:r>
-              <a:rPr lang="en-US" dirty="0">
-                <a:solidFill>
-                  <a:schemeClr val="bg2">
-                    <a:lumMod val="50000"/>
-                  </a:schemeClr>
-                </a:solidFill>
-              </a:rPr>
-              <a:t> processing the raw </a:t>
-            </a:r>
-            <a:r>
-              <a:rPr lang="en-US" dirty="0" smtClean="0">
-                <a:solidFill>
-                  <a:schemeClr val="bg2">
-                    <a:lumMod val="50000"/>
-                  </a:schemeClr>
-                </a:solidFill>
-              </a:rPr>
-              <a:t>sequence </a:t>
-            </a:r>
-            <a:r>
-              <a:rPr lang="en-US" dirty="0">
-                <a:solidFill>
-                  <a:schemeClr val="bg2">
-                    <a:lumMod val="50000"/>
-                  </a:schemeClr>
-                </a:solidFill>
-              </a:rPr>
-              <a:t>data into form amenable for statistical analysis </a:t>
-            </a:r>
-            <a:r>
-              <a:rPr lang="en-US" sz="1800" dirty="0">
-                <a:solidFill>
-                  <a:schemeClr val="bg2">
-                    <a:lumMod val="50000"/>
-                  </a:schemeClr>
-                </a:solidFill>
-              </a:rPr>
-              <a:t>(i.e. </a:t>
-            </a:r>
-            <a:r>
-              <a:rPr lang="en-US" sz="1800" dirty="0" smtClean="0">
-                <a:solidFill>
-                  <a:schemeClr val="bg2">
-                    <a:lumMod val="50000"/>
-                  </a:schemeClr>
-                </a:solidFill>
-              </a:rPr>
-              <a:t>taxa by sample </a:t>
-            </a:r>
-            <a:r>
-              <a:rPr lang="en-US" sz="1800" dirty="0">
-                <a:solidFill>
-                  <a:schemeClr val="bg2">
-                    <a:lumMod val="50000"/>
-                  </a:schemeClr>
-                </a:solidFill>
-              </a:rPr>
-              <a:t>count matrix)</a:t>
-            </a:r>
-          </a:p>
-          <a:p>
-            <a:pPr lvl="1"/>
-            <a:r>
-              <a:rPr lang="en-US" b="1" dirty="0"/>
-              <a:t>Step 2:</a:t>
-            </a:r>
-            <a:r>
-              <a:rPr lang="en-US" dirty="0"/>
-              <a:t> </a:t>
-            </a:r>
-            <a:r>
-              <a:rPr lang="en-US" dirty="0" smtClean="0"/>
-              <a:t>correlating </a:t>
-            </a:r>
-            <a:r>
-              <a:rPr lang="en-US" dirty="0"/>
-              <a:t>microbial features with outcomes of interest</a:t>
-            </a:r>
-          </a:p>
-        </p:txBody>
-      </p:sp>
-    </p:spTree>
-    <p:extLst>
-      <p:ext uri="{BB962C8B-B14F-4D97-AF65-F5344CB8AC3E}">
-        <p14:creationId xmlns:p14="http://schemas.microsoft.com/office/powerpoint/2010/main" val="3531814522"/>
-      </p:ext>
-    </p:extLst>
-  </p:cSld>
-  <p:clrMapOvr>
-    <a:masterClrMapping/>
-  </p:clrMapOvr>
-  <p:timing>
-    <p:tnLst>
-      <p:par>
-        <p:cTn id="1" dur="indefinite" restart="never" nodeType="tmRoot"/>
-      </p:par>
-    </p:tnLst>
-  </p:timing>
-</p:sld>
-</file>
-
 <file path=ppt/slides/slide4.xml><?xml version="1.0" encoding="utf-8"?>
 <p:sld xmlns:a="http://schemas.openxmlformats.org/drawingml/2006/main" xmlns:r="http://schemas.openxmlformats.org/officeDocument/2006/relationships" xmlns:p="http://schemas.openxmlformats.org/presentationml/2006/main">
   <p:cSld>
@@ -19777,7 +19493,7 @@
           <p:cNvPr id="2" name="Title 1">
             <a:extLst>
               <a:ext uri="{FF2B5EF4-FFF2-40B4-BE49-F238E27FC236}">
-                <a16:creationId xmlns="" xmlns:a16="http://schemas.microsoft.com/office/drawing/2014/main" id="{B16B8156-2A8E-0545-976C-FEFBCDDCB145}"/>
+                <a16:creationId xmlns:a16="http://schemas.microsoft.com/office/drawing/2014/main" xmlns="" id="{B16B8156-2A8E-0545-976C-FEFBCDDCB145}"/>
               </a:ext>
             </a:extLst>
           </p:cNvPr>
@@ -19795,12 +19511,8 @@
           <a:p>
             <a:pPr algn="ctr"/>
             <a:r>
-              <a:rPr lang="en-US" dirty="0" smtClean="0"/>
-              <a:t>Challenging Features </a:t>
-            </a:r>
-            <a:r>
               <a:rPr lang="en-US" dirty="0"/>
-              <a:t>of Microbiome Data</a:t>
+              <a:t>Challenging Features of Microbiome Data</a:t>
             </a:r>
           </a:p>
         </p:txBody>
@@ -19810,7 +19522,7 @@
           <p:cNvPr id="3" name="Content Placeholder 2">
             <a:extLst>
               <a:ext uri="{FF2B5EF4-FFF2-40B4-BE49-F238E27FC236}">
-                <a16:creationId xmlns="" xmlns:a16="http://schemas.microsoft.com/office/drawing/2014/main" id="{C2611B1E-51D1-3442-B5B6-262A8689B749}"/>
+                <a16:creationId xmlns:a16="http://schemas.microsoft.com/office/drawing/2014/main" xmlns="" id="{C2611B1E-51D1-3442-B5B6-262A8689B749}"/>
               </a:ext>
             </a:extLst>
           </p:cNvPr>
@@ -19835,25 +19547,20 @@
           <a:p>
             <a:r>
               <a:rPr lang="en-US" dirty="0"/>
-              <a:t>High dimensional count </a:t>
-            </a:r>
-            <a:r>
-              <a:rPr lang="en-US" dirty="0" smtClean="0"/>
-              <a:t>matrix: </a:t>
-            </a:r>
-            <a:r>
-              <a:rPr lang="en-US" i="1" dirty="0" smtClean="0"/>
+              <a:t>High dimensional count matrix: </a:t>
+            </a:r>
+            <a:r>
+              <a:rPr lang="en-US" i="1" dirty="0"/>
               <a:t>p</a:t>
             </a:r>
             <a:r>
-              <a:rPr lang="en-US" dirty="0" smtClean="0"/>
+              <a:rPr lang="en-US" dirty="0"/>
               <a:t> &gt; </a:t>
             </a:r>
             <a:r>
-              <a:rPr lang="en-US" i="1" dirty="0" smtClean="0"/>
+              <a:rPr lang="en-US" i="1" dirty="0"/>
               <a:t>n</a:t>
             </a:r>
-            <a:endParaRPr lang="en-US" i="1" dirty="0"/>
           </a:p>
           <a:p>
             <a:endParaRPr lang="en-US" sz="1000" dirty="0"/>
@@ -19895,70 +19602,29 @@
             <a:pPr lvl="2"/>
             <a:r>
               <a:rPr lang="en-US" dirty="0"/>
-              <a:t>T</a:t>
-            </a:r>
-            <a:r>
-              <a:rPr lang="en-US" dirty="0" smtClean="0"/>
-              <a:t>otal </a:t>
-            </a:r>
+              <a:t>Total number of reads not directly tied to the starting quantity of DNA</a:t>
+            </a:r>
+          </a:p>
+          <a:p>
+            <a:pPr lvl="2"/>
             <a:r>
               <a:rPr lang="en-US" dirty="0"/>
-              <a:t>number of reads </a:t>
-            </a:r>
-            <a:r>
-              <a:rPr lang="en-US" dirty="0" smtClean="0"/>
-              <a:t>not </a:t>
-            </a:r>
+              <a:t>Think of as getting assigned by a random sampling process where only proportion is “correct”</a:t>
+            </a:r>
+          </a:p>
+          <a:p>
+            <a:pPr lvl="2"/>
             <a:r>
               <a:rPr lang="en-US" dirty="0"/>
-              <a:t>directly tied to the starting quantity of </a:t>
-            </a:r>
-            <a:r>
-              <a:rPr lang="en-US" dirty="0" smtClean="0"/>
-              <a:t>DNA</a:t>
+              <a:t>Means that values only carry information on the relative abundance of taxa (not absolute info.) </a:t>
             </a:r>
           </a:p>
           <a:p>
             <a:pPr lvl="2"/>
             <a:r>
-              <a:rPr lang="en-US" dirty="0" smtClean="0"/>
-              <a:t>Think of as getting </a:t>
-            </a:r>
-            <a:r>
               <a:rPr lang="en-US" dirty="0"/>
-              <a:t>assigned by a random sampling </a:t>
-            </a:r>
-            <a:r>
-              <a:rPr lang="en-US" dirty="0" smtClean="0"/>
-              <a:t>process</a:t>
-            </a:r>
-          </a:p>
-          <a:p>
-            <a:pPr lvl="2"/>
-            <a:r>
-              <a:rPr lang="en-US" dirty="0" smtClean="0"/>
-              <a:t>Means that </a:t>
-            </a:r>
-            <a:r>
-              <a:rPr lang="en-US" dirty="0" smtClean="0"/>
-              <a:t>values </a:t>
-            </a:r>
-            <a:r>
-              <a:rPr lang="en-US" dirty="0" smtClean="0"/>
-              <a:t>only carry information on the relative abundance of taxa (not absolute info.) </a:t>
-            </a:r>
-          </a:p>
-          <a:p>
-            <a:pPr lvl="2"/>
-            <a:r>
-              <a:rPr lang="en-US" dirty="0" smtClean="0"/>
-              <a:t>Compositional </a:t>
-            </a:r>
-            <a:r>
-              <a:rPr lang="en-US" dirty="0" smtClean="0"/>
-              <a:t>data invalidate most standard statistical approaches</a:t>
-            </a:r>
-            <a:endParaRPr lang="en-US" dirty="0"/>
+              <a:t>Compositional data invalidate most standard statistical approaches</a:t>
+            </a:r>
           </a:p>
         </p:txBody>
       </p:sp>
@@ -20023,10 +19689,9 @@
           <a:p>
             <a:pPr algn="ctr"/>
             <a:r>
-              <a:rPr lang="en-US" dirty="0" smtClean="0"/>
+              <a:rPr lang="en-US" dirty="0"/>
               <a:t>Accounting for Library Size and Compositional Data </a:t>
             </a:r>
-            <a:endParaRPr lang="en-US" dirty="0"/>
           </a:p>
         </p:txBody>
       </p:sp>
@@ -20053,39 +19718,39 @@
           <a:lstStyle/>
           <a:p>
             <a:r>
-              <a:rPr lang="en-US" dirty="0" smtClean="0"/>
+              <a:rPr lang="en-US" dirty="0"/>
               <a:t>Standardize read counts using </a:t>
             </a:r>
             <a:r>
-              <a:rPr lang="en-US" b="1" dirty="0" smtClean="0"/>
+              <a:rPr lang="en-US" b="1" dirty="0"/>
               <a:t>external information</a:t>
             </a:r>
             <a:r>
-              <a:rPr lang="en-US" dirty="0" smtClean="0"/>
+              <a:rPr lang="en-US" dirty="0"/>
               <a:t>: spike-in or qPCR</a:t>
             </a:r>
           </a:p>
           <a:p>
             <a:pPr lvl="1"/>
-            <a:endParaRPr lang="en-US" sz="1600" dirty="0" smtClean="0"/>
-          </a:p>
-          <a:p>
-            <a:r>
-              <a:rPr lang="en-US" b="1" dirty="0" smtClean="0"/>
+            <a:endParaRPr lang="en-US" sz="1600" dirty="0"/>
+          </a:p>
+          <a:p>
+            <a:r>
+              <a:rPr lang="en-US" b="1" dirty="0"/>
               <a:t>Normalize </a:t>
             </a:r>
             <a:r>
-              <a:rPr lang="en-US" dirty="0" smtClean="0"/>
+              <a:rPr lang="en-US" dirty="0"/>
               <a:t>counts to account for variation in sequencing depths</a:t>
             </a:r>
           </a:p>
           <a:p>
             <a:pPr lvl="1"/>
             <a:r>
-              <a:rPr lang="en-US" dirty="0" smtClean="0"/>
+              <a:rPr lang="en-US" dirty="0"/>
               <a:t>Calculate “size factor” for each sample as an estimate of standardized library size</a:t>
             </a:r>
-            <a:endParaRPr lang="en-US" dirty="0" smtClean="0">
+            <a:endParaRPr lang="en-US" dirty="0">
               <a:solidFill>
                 <a:srgbClr val="FF0000"/>
               </a:solidFill>
@@ -20094,21 +19759,21 @@
           <a:p>
             <a:pPr lvl="1"/>
             <a:r>
-              <a:rPr lang="en-US" dirty="0" smtClean="0"/>
+              <a:rPr lang="en-US" dirty="0"/>
               <a:t>Divide the read counts by size factor to produce normalized data</a:t>
             </a:r>
           </a:p>
           <a:p>
             <a:pPr lvl="1"/>
             <a:r>
-              <a:rPr lang="en-US" dirty="0" smtClean="0"/>
+              <a:rPr lang="en-US" dirty="0"/>
               <a:t>Works well when most taxa are invariant to the condition under study</a:t>
             </a:r>
           </a:p>
           <a:p>
             <a:pPr lvl="1"/>
             <a:r>
-              <a:rPr lang="en-US" dirty="0" smtClean="0">
+              <a:rPr lang="en-US" dirty="0">
                 <a:solidFill>
                   <a:srgbClr val="FF0000"/>
                 </a:solidFill>
@@ -20118,47 +19783,56 @@
           </a:p>
           <a:p>
             <a:pPr lvl="1"/>
-            <a:endParaRPr lang="en-US" sz="1600" dirty="0" smtClean="0"/>
-          </a:p>
-          <a:p>
+            <a:endParaRPr lang="en-US" sz="1600" dirty="0"/>
+          </a:p>
+          <a:p>
+            <a:r>
+              <a:rPr lang="en-US" b="1" dirty="0"/>
+              <a:t>Log-ratio </a:t>
+            </a:r>
             <a:r>
               <a:rPr lang="en-US" b="1" dirty="0" smtClean="0"/>
-              <a:t>Log-ratio transformation </a:t>
-            </a:r>
+              <a:t>transformation</a:t>
+            </a:r>
+            <a:endParaRPr lang="en-US" dirty="0"/>
+          </a:p>
+          <a:p>
+            <a:pPr lvl="1"/>
             <a:r>
               <a:rPr lang="en-US" dirty="0" smtClean="0"/>
-              <a:t>to</a:t>
-            </a:r>
-            <a:r>
-              <a:rPr lang="en-US" b="1" dirty="0" smtClean="0"/>
-              <a:t> </a:t>
+              <a:t>Ratio </a:t>
+            </a:r>
+            <a:r>
+              <a:rPr lang="en-US" dirty="0"/>
+              <a:t>of each taxa relative to some basis on the logarithmic </a:t>
             </a:r>
             <a:r>
               <a:rPr lang="en-US" dirty="0" smtClean="0"/>
-              <a:t>move from constrained to Euclidian space</a:t>
+              <a:t>scale</a:t>
             </a:r>
           </a:p>
           <a:p>
             <a:pPr lvl="1"/>
             <a:r>
+              <a:rPr lang="en-US" dirty="0"/>
+              <a:t>Change in coordinate system to remove compositional </a:t>
+            </a:r>
+            <a:r>
               <a:rPr lang="en-US" dirty="0" smtClean="0"/>
-              <a:t>Change in coordinate system to remove compositional constraint</a:t>
-            </a:r>
+              <a:t>constraint</a:t>
+            </a:r>
+            <a:endParaRPr lang="en-US" dirty="0"/>
           </a:p>
           <a:p>
             <a:pPr lvl="1"/>
             <a:r>
-              <a:rPr lang="en-US" dirty="0" smtClean="0"/>
-              <a:t>Ratio of each taxa relative to some basis on the logarithmic scale</a:t>
-            </a:r>
-          </a:p>
-          <a:p>
-            <a:pPr lvl="1"/>
-            <a:r>
-              <a:rPr lang="en-US" dirty="0" smtClean="0"/>
-              <a:t>CLR: ratio of each component to geometric mean of all others on log scale</a:t>
-            </a:r>
-            <a:endParaRPr lang="en-US" dirty="0"/>
+              <a:rPr lang="en-US" b="1" dirty="0"/>
+              <a:t>CLR</a:t>
+            </a:r>
+            <a:r>
+              <a:rPr lang="en-US" dirty="0"/>
+              <a:t>: ratio of each component to geometric mean of all others on log scale</a:t>
+            </a:r>
           </a:p>
         </p:txBody>
       </p:sp>
@@ -20216,10 +19890,9 @@
           <a:p>
             <a:pPr algn="ctr"/>
             <a:r>
-              <a:rPr lang="en-US" dirty="0" smtClean="0"/>
+              <a:rPr lang="en-US" dirty="0"/>
               <a:t>Alpha-Diversity</a:t>
             </a:r>
-            <a:endParaRPr lang="en-US" dirty="0"/>
           </a:p>
         </p:txBody>
       </p:sp>
@@ -20233,61 +19906,51 @@
             <p:ph idx="1"/>
           </p:nvPr>
         </p:nvSpPr>
-        <p:spPr/>
-        <p:txBody>
-          <a:bodyPr/>
+        <p:spPr>
+          <a:xfrm>
+            <a:off x="838200" y="1825624"/>
+            <a:ext cx="10515600" cy="4888213"/>
+          </a:xfrm>
+        </p:spPr>
+        <p:txBody>
+          <a:bodyPr>
+            <a:normAutofit/>
+          </a:bodyPr>
           <a:lstStyle/>
           <a:p>
             <a:r>
               <a:rPr lang="en-US" b="1" dirty="0"/>
-              <a:t>D</a:t>
-            </a:r>
-            <a:r>
-              <a:rPr lang="en-US" b="1" dirty="0" smtClean="0"/>
-              <a:t>iversity </a:t>
-            </a:r>
+              <a:t>Diversity in a single ecosystem or sample</a:t>
+            </a:r>
+          </a:p>
+          <a:p>
+            <a:endParaRPr lang="en-US" sz="1200" dirty="0"/>
+          </a:p>
+          <a:p>
+            <a:r>
+              <a:rPr lang="en-US" dirty="0"/>
+              <a:t>Comprised of:</a:t>
+            </a:r>
+          </a:p>
+          <a:p>
+            <a:pPr lvl="1"/>
             <a:r>
               <a:rPr lang="en-US" b="1" dirty="0"/>
-              <a:t>in a single ecosystem or </a:t>
-            </a:r>
-            <a:r>
-              <a:rPr lang="en-US" b="1" dirty="0" smtClean="0"/>
-              <a:t>sample</a:t>
-            </a:r>
-          </a:p>
-          <a:p>
-            <a:endParaRPr lang="en-US" sz="1200" dirty="0"/>
-          </a:p>
-          <a:p>
-            <a:r>
-              <a:rPr lang="en-US" dirty="0" smtClean="0"/>
-              <a:t>Comprised of:</a:t>
+              <a:t>Richness</a:t>
+            </a:r>
+            <a:r>
+              <a:rPr lang="en-US" dirty="0"/>
+              <a:t> – number of unique taxa in an environment</a:t>
             </a:r>
           </a:p>
           <a:p>
             <a:pPr lvl="1"/>
             <a:r>
-              <a:rPr lang="en-US" b="1" dirty="0" smtClean="0"/>
-              <a:t>Richness</a:t>
-            </a:r>
-            <a:r>
-              <a:rPr lang="en-US" dirty="0" smtClean="0"/>
-              <a:t> – number of unique taxa in </a:t>
-            </a:r>
-            <a:r>
-              <a:rPr lang="en-US" dirty="0" smtClean="0"/>
-              <a:t>an environment</a:t>
-            </a:r>
-            <a:endParaRPr lang="en-US" dirty="0" smtClean="0"/>
-          </a:p>
-          <a:p>
-            <a:pPr lvl="1"/>
-            <a:r>
-              <a:rPr lang="en-US" b="1" dirty="0" smtClean="0"/>
+              <a:rPr lang="en-US" b="1" dirty="0"/>
               <a:t>Evenness</a:t>
             </a:r>
             <a:r>
-              <a:rPr lang="en-US" dirty="0" smtClean="0"/>
+              <a:rPr lang="en-US" dirty="0"/>
               <a:t> – how evenly taxa are dispersed</a:t>
             </a:r>
           </a:p>
@@ -20297,7 +19960,7 @@
           </a:p>
           <a:p>
             <a:r>
-              <a:rPr lang="en-US" dirty="0" smtClean="0"/>
+              <a:rPr lang="en-US" dirty="0"/>
               <a:t>Limited ability to estimate these quantities accurately using NGS data:</a:t>
             </a:r>
           </a:p>
@@ -20305,35 +19968,63 @@
             <a:pPr lvl="1"/>
             <a:r>
               <a:rPr lang="en-US" dirty="0"/>
-              <a:t>R</a:t>
-            </a:r>
-            <a:r>
-              <a:rPr lang="en-US" dirty="0" smtClean="0"/>
-              <a:t>ichness underestimated </a:t>
-            </a:r>
+              <a:t>Richness underestimated due to inexhaustive sampling. Requires extrapolation estimators</a:t>
+            </a:r>
+          </a:p>
+          <a:p>
+            <a:pPr lvl="1"/>
             <a:r>
               <a:rPr lang="en-US" dirty="0"/>
-              <a:t>due to inexhaustive sampling. </a:t>
-            </a:r>
-            <a:r>
-              <a:rPr lang="en-US" dirty="0" smtClean="0"/>
-              <a:t>Requires extrapolation estimators</a:t>
-            </a:r>
-          </a:p>
-          <a:p>
-            <a:pPr lvl="1"/>
-            <a:r>
-              <a:rPr lang="en-US" dirty="0" smtClean="0"/>
-              <a:t>Extrapolation estimators require accurate singleton counts which </a:t>
+              <a:t>Extrapolation estimators require accurate singleton </a:t>
+            </a:r>
+            <a:r>
+              <a:rPr lang="en-US" sz="1600" dirty="0"/>
+              <a:t>(and low abundance) </a:t>
             </a:r>
             <a:r>
               <a:rPr lang="en-US" dirty="0"/>
-              <a:t>generally cannot be differentiated from sequencing </a:t>
+              <a:t>counts which generally cannot be differentiated from sequencing </a:t>
             </a:r>
             <a:r>
               <a:rPr lang="en-US" dirty="0" smtClean="0"/>
               <a:t>errors</a:t>
             </a:r>
+          </a:p>
+          <a:p>
+            <a:pPr lvl="1"/>
+            <a:r>
+              <a:rPr lang="en-US" dirty="0"/>
+              <a:t>e</a:t>
+            </a:r>
+            <a:r>
+              <a:rPr lang="en-US" dirty="0" smtClean="0"/>
+              <a:t>.g. Chao1 = N</a:t>
+            </a:r>
+            <a:r>
+              <a:rPr lang="en-US" baseline="-25000" dirty="0" smtClean="0"/>
+              <a:t>obs</a:t>
+            </a:r>
+            <a:r>
+              <a:rPr lang="en-US" dirty="0" smtClean="0"/>
+              <a:t> </a:t>
+            </a:r>
+            <a:r>
+              <a:rPr lang="en-US" dirty="0"/>
+              <a:t>+ S</a:t>
+            </a:r>
+            <a:r>
+              <a:rPr lang="en-US" baseline="30000" dirty="0"/>
+              <a:t>2</a:t>
+            </a:r>
+            <a:r>
+              <a:rPr lang="en-US" dirty="0"/>
+              <a:t> / (2 </a:t>
+            </a:r>
+            <a:r>
+              <a:rPr lang="en-US" dirty="0" smtClean="0"/>
+              <a:t>D) ; where S = singletons and D = doubletons </a:t>
+            </a:r>
+            <a:endParaRPr lang="en-US" dirty="0"/>
           </a:p>
           <a:p>
             <a:pPr lvl="1"/>
@@ -20395,10 +20086,9 @@
           <a:p>
             <a:pPr algn="ctr"/>
             <a:r>
-              <a:rPr lang="en-US" dirty="0" smtClean="0"/>
+              <a:rPr lang="en-US" dirty="0"/>
               <a:t>Alpha-Diversity Estimators</a:t>
             </a:r>
-            <a:endParaRPr lang="en-US" dirty="0"/>
           </a:p>
         </p:txBody>
       </p:sp>
@@ -20425,11 +20115,11 @@
           <a:lstStyle/>
           <a:p>
             <a:r>
-              <a:rPr lang="en-US" b="1" dirty="0" smtClean="0"/>
+              <a:rPr lang="en-US" b="1" dirty="0"/>
               <a:t>Observed richness</a:t>
             </a:r>
             <a:r>
-              <a:rPr lang="en-US" dirty="0" smtClean="0"/>
+              <a:rPr lang="en-US" dirty="0"/>
               <a:t>:</a:t>
             </a:r>
           </a:p>
@@ -20437,24 +20127,20 @@
             <a:pPr lvl="1"/>
             <a:r>
               <a:rPr lang="en-US" dirty="0"/>
-              <a:t>C</a:t>
-            </a:r>
-            <a:r>
-              <a:rPr lang="en-US" dirty="0" smtClean="0"/>
-              <a:t>ount of unique taxa</a:t>
+              <a:t>Count of unique taxa</a:t>
             </a:r>
           </a:p>
           <a:p>
             <a:pPr lvl="1"/>
             <a:r>
-              <a:rPr lang="en-US" dirty="0" smtClean="0"/>
+              <a:rPr lang="en-US" dirty="0"/>
               <a:t>Downwardly biased</a:t>
             </a:r>
           </a:p>
           <a:p>
             <a:pPr lvl="2"/>
             <a:r>
-              <a:rPr lang="en-US" dirty="0" smtClean="0"/>
+              <a:rPr lang="en-US" dirty="0"/>
               <a:t>Bias is systematic if samples have same </a:t>
             </a:r>
           </a:p>
@@ -20464,11 +20150,7 @@
             </a:pPr>
             <a:r>
               <a:rPr lang="en-US" dirty="0"/>
-              <a:t> </a:t>
-            </a:r>
-            <a:r>
-              <a:rPr lang="en-US" dirty="0" smtClean="0"/>
-              <a:t>   abundance structure</a:t>
+              <a:t>    abundance structure</a:t>
             </a:r>
           </a:p>
           <a:p>
@@ -20477,18 +20159,18 @@
           </a:p>
           <a:p>
             <a:r>
-              <a:rPr lang="en-US" b="1" dirty="0" smtClean="0"/>
+              <a:rPr lang="en-US" b="1" dirty="0"/>
               <a:t>Shannon Diversity</a:t>
             </a:r>
             <a:r>
-              <a:rPr lang="en-US" dirty="0" smtClean="0"/>
+              <a:rPr lang="en-US" dirty="0"/>
               <a:t>:</a:t>
             </a:r>
           </a:p>
           <a:p>
             <a:pPr lvl="1"/>
             <a:r>
-              <a:rPr lang="en-US" dirty="0" smtClean="0"/>
+              <a:rPr lang="en-US" dirty="0"/>
               <a:t>Summation of prob. x ln(prob.) of observing </a:t>
             </a:r>
           </a:p>
@@ -20498,17 +20180,13 @@
             </a:pPr>
             <a:r>
               <a:rPr lang="en-US" dirty="0"/>
-              <a:t> </a:t>
-            </a:r>
-            <a:r>
-              <a:rPr lang="en-US" dirty="0" smtClean="0"/>
-              <a:t>   each taxon multiplied by -1</a:t>
+              <a:t>    each taxon multiplied by -1</a:t>
             </a:r>
           </a:p>
           <a:p>
             <a:pPr lvl="1"/>
             <a:r>
-              <a:rPr lang="en-US" dirty="0" smtClean="0"/>
+              <a:rPr lang="en-US" dirty="0"/>
               <a:t>Higher number is more diverse environment </a:t>
             </a:r>
           </a:p>
@@ -20518,11 +20196,11 @@
           </a:p>
           <a:p>
             <a:r>
-              <a:rPr lang="en-US" b="1" dirty="0" smtClean="0"/>
+              <a:rPr lang="en-US" b="1" dirty="0"/>
               <a:t>Faith’s Phylogenetic Diversity</a:t>
             </a:r>
             <a:r>
-              <a:rPr lang="en-US" dirty="0" smtClean="0"/>
+              <a:rPr lang="en-US" dirty="0"/>
               <a:t>:</a:t>
             </a:r>
           </a:p>
@@ -20530,25 +20208,12 @@
             <a:pPr lvl="1"/>
             <a:r>
               <a:rPr lang="en-US" dirty="0"/>
-              <a:t>S</a:t>
-            </a:r>
-            <a:r>
-              <a:rPr lang="en-US" dirty="0" smtClean="0"/>
-              <a:t>um </a:t>
-            </a:r>
-            <a:r>
-              <a:rPr lang="en-US" dirty="0"/>
-              <a:t>of the lengths </a:t>
-            </a:r>
-            <a:r>
-              <a:rPr lang="en-US" dirty="0" smtClean="0"/>
-              <a:t>branches on a phylogenetic tree</a:t>
-            </a:r>
+              <a:t>Sum of the lengths branches on a phylogenetic tree</a:t>
+            </a:r>
+          </a:p>
+          <a:p>
+            <a:pPr lvl="1"/>
             <a:endParaRPr lang="en-US" dirty="0"/>
-          </a:p>
-          <a:p>
-            <a:pPr lvl="1"/>
-            <a:endParaRPr lang="en-US" dirty="0" smtClean="0"/>
           </a:p>
         </p:txBody>
       </p:sp>
@@ -20599,18 +20264,17 @@
           <a:lstStyle/>
           <a:p>
             <a:r>
-              <a:rPr lang="en-US" dirty="0" smtClean="0"/>
+              <a:rPr lang="en-US" dirty="0"/>
               <a:t>Willis, </a:t>
             </a:r>
             <a:r>
-              <a:rPr lang="en-US" dirty="0" err="1" smtClean="0"/>
+              <a:rPr lang="en-US" dirty="0" err="1"/>
               <a:t>bioRxiv</a:t>
             </a:r>
             <a:r>
-              <a:rPr lang="en-US" dirty="0" smtClean="0"/>
+              <a:rPr lang="en-US" dirty="0"/>
               <a:t>, 2017.</a:t>
             </a:r>
-            <a:endParaRPr lang="en-US" dirty="0"/>
           </a:p>
         </p:txBody>
       </p:sp>
@@ -20637,10 +20301,9 @@
           <a:lstStyle/>
           <a:p>
             <a:r>
-              <a:rPr lang="en-US" sz="1200" dirty="0" smtClean="0"/>
+              <a:rPr lang="en-US" sz="1200" dirty="0"/>
               <a:t>Bias systemic if these curves are the same, but this cannot be estimated from the data.</a:t>
             </a:r>
-            <a:endParaRPr lang="en-US" sz="1200" dirty="0"/>
           </a:p>
         </p:txBody>
       </p:sp>
@@ -20698,10 +20361,9 @@
           <a:p>
             <a:pPr algn="ctr"/>
             <a:r>
-              <a:rPr lang="en-US" dirty="0" smtClean="0"/>
+              <a:rPr lang="en-US" dirty="0"/>
               <a:t>Beta-Diversity</a:t>
             </a:r>
-            <a:endParaRPr lang="en-US" dirty="0"/>
           </a:p>
         </p:txBody>
       </p:sp>
@@ -20728,35 +20390,23 @@
           <a:lstStyle/>
           <a:p>
             <a:r>
-              <a:rPr lang="en-US" dirty="0" smtClean="0"/>
+              <a:rPr lang="en-US" dirty="0"/>
               <a:t>Whittaker </a:t>
             </a:r>
             <a:r>
-              <a:rPr lang="en-US" sz="1800" dirty="0" smtClean="0"/>
+              <a:rPr lang="en-US" sz="1800" dirty="0"/>
               <a:t>(1960) </a:t>
             </a:r>
             <a:r>
-              <a:rPr lang="en-US" dirty="0" smtClean="0"/>
-              <a:t>defined it as </a:t>
-            </a:r>
-            <a:r>
               <a:rPr lang="en-US" dirty="0"/>
-              <a:t>“</a:t>
+              <a:t>defined it as “</a:t>
             </a:r>
             <a:r>
               <a:rPr lang="en-US" b="1" dirty="0"/>
-              <a:t>the extent of change in community composition, or degree of community differentiation, in relation to a </a:t>
-            </a:r>
-            <a:r>
-              <a:rPr lang="en-US" b="1" dirty="0" smtClean="0"/>
-              <a:t>complex-gradient </a:t>
-            </a:r>
-            <a:r>
-              <a:rPr lang="en-US" b="1" dirty="0"/>
-              <a:t>of environment, or a pattern of environments</a:t>
-            </a:r>
-            <a:r>
-              <a:rPr lang="en-US" dirty="0" smtClean="0"/>
+              <a:t>the extent of change in community composition, or degree of community differentiation, in relation to a complex-gradient of environment, or a pattern of environments</a:t>
+            </a:r>
+            <a:r>
+              <a:rPr lang="en-US" dirty="0"/>
               <a:t>”</a:t>
             </a:r>
           </a:p>
@@ -20764,16 +20414,12 @@
             <a:pPr marL="0" indent="0">
               <a:buNone/>
             </a:pPr>
-            <a:endParaRPr lang="en-US" sz="1200" dirty="0" smtClean="0"/>
+            <a:endParaRPr lang="en-US" sz="1200" dirty="0"/>
           </a:p>
           <a:p>
             <a:r>
               <a:rPr lang="en-US" dirty="0"/>
-              <a:t>Measure of similarity (or dissimilarity) of one microbial composition to </a:t>
-            </a:r>
-            <a:r>
-              <a:rPr lang="en-US" dirty="0" smtClean="0"/>
-              <a:t>another</a:t>
+              <a:t>Measure of similarity (or dissimilarity) of one microbial composition to another</a:t>
             </a:r>
           </a:p>
           <a:p>
@@ -20781,20 +20427,20 @@
           </a:p>
           <a:p>
             <a:r>
-              <a:rPr lang="en-US" dirty="0" smtClean="0"/>
+              <a:rPr lang="en-US" dirty="0"/>
               <a:t>Can be based on presence/absence or incorporate abundance</a:t>
             </a:r>
           </a:p>
           <a:p>
-            <a:endParaRPr lang="en-US" sz="1200" dirty="0" smtClean="0"/>
-          </a:p>
-          <a:p>
-            <a:r>
-              <a:rPr lang="en-US" dirty="0" smtClean="0"/>
+            <a:endParaRPr lang="en-US" sz="1200" dirty="0"/>
+          </a:p>
+          <a:p>
+            <a:r>
+              <a:rPr lang="en-US" dirty="0"/>
               <a:t>Often used for exploratory analysis of the similarity in microbial assemblages </a:t>
             </a:r>
             <a:r>
-              <a:rPr lang="en-US" sz="1800" dirty="0" smtClean="0"/>
+              <a:rPr lang="en-US" sz="1800" dirty="0"/>
               <a:t>(beta-diversity ordination)</a:t>
             </a:r>
           </a:p>
@@ -20860,10 +20506,9 @@
           <a:p>
             <a:pPr algn="ctr"/>
             <a:r>
-              <a:rPr lang="en-US" dirty="0" smtClean="0"/>
+              <a:rPr lang="en-US" dirty="0"/>
               <a:t>Beta-Diversity Estimators</a:t>
             </a:r>
-            <a:endParaRPr lang="en-US" dirty="0"/>
           </a:p>
         </p:txBody>
       </p:sp>
@@ -20888,118 +20533,85 @@
           <a:lstStyle/>
           <a:p>
             <a:r>
-              <a:rPr lang="en-US" b="1" dirty="0" smtClean="0"/>
+              <a:rPr lang="en-US" b="1" dirty="0"/>
               <a:t>Bray-Curtis dissimilarity</a:t>
             </a:r>
             <a:r>
-              <a:rPr lang="en-US" dirty="0" smtClean="0"/>
+              <a:rPr lang="en-US" dirty="0"/>
               <a:t>:</a:t>
             </a:r>
           </a:p>
           <a:p>
             <a:pPr lvl="1"/>
             <a:r>
-              <a:rPr lang="en-US" dirty="0" smtClean="0"/>
+              <a:rPr lang="en-US" dirty="0"/>
               <a:t>Popular dissimilarity metric in ecology</a:t>
             </a:r>
           </a:p>
           <a:p>
             <a:pPr lvl="1"/>
             <a:r>
-              <a:rPr lang="en-US" dirty="0" smtClean="0"/>
+              <a:rPr lang="en-US" dirty="0"/>
               <a:t>1 – (2 x the lesser count of the intersection of taxa) / total taxa both sites</a:t>
             </a:r>
           </a:p>
           <a:p>
             <a:pPr lvl="1"/>
             <a:r>
-              <a:rPr lang="en-US" dirty="0" smtClean="0"/>
+              <a:rPr lang="en-US" dirty="0"/>
               <a:t>Values range from 0 to 1</a:t>
             </a:r>
           </a:p>
           <a:p>
             <a:pPr lvl="1"/>
             <a:r>
-              <a:rPr lang="en-US" dirty="0" smtClean="0"/>
-              <a:t>BC = 0 if sites </a:t>
-            </a:r>
-            <a:r>
               <a:rPr lang="en-US" dirty="0"/>
-              <a:t>share all </a:t>
-            </a:r>
-            <a:r>
-              <a:rPr lang="en-US" dirty="0" smtClean="0"/>
-              <a:t>the same taxa; BC = 1 if they </a:t>
-            </a:r>
-            <a:r>
-              <a:rPr lang="en-US" dirty="0"/>
-              <a:t>don’t share </a:t>
-            </a:r>
-            <a:r>
-              <a:rPr lang="en-US" dirty="0" smtClean="0"/>
-              <a:t>any</a:t>
+              <a:t>BC = 0 if sites share all the same taxa; BC = 1 if they don’t share any</a:t>
             </a:r>
           </a:p>
           <a:p>
             <a:pPr marL="457200" lvl="1" indent="0">
               <a:buNone/>
             </a:pPr>
-            <a:endParaRPr lang="en-US" dirty="0" smtClean="0"/>
-          </a:p>
-          <a:p>
-            <a:r>
-              <a:rPr lang="en-US" b="1" dirty="0" smtClean="0"/>
+            <a:endParaRPr lang="en-US" dirty="0"/>
+          </a:p>
+          <a:p>
+            <a:r>
+              <a:rPr lang="en-US" b="1" dirty="0"/>
               <a:t>UniFrac distance</a:t>
             </a:r>
             <a:r>
-              <a:rPr lang="en-US" dirty="0" smtClean="0"/>
+              <a:rPr lang="en-US" dirty="0"/>
               <a:t>:</a:t>
             </a:r>
           </a:p>
           <a:p>
             <a:pPr lvl="1"/>
             <a:r>
-              <a:rPr lang="en-US" dirty="0" smtClean="0"/>
+              <a:rPr lang="en-US" dirty="0"/>
               <a:t>Popular distance measure in microbial ecology</a:t>
             </a:r>
           </a:p>
           <a:p>
             <a:pPr lvl="1"/>
             <a:r>
-              <a:rPr lang="en-US" dirty="0" smtClean="0"/>
+              <a:rPr lang="en-US" dirty="0"/>
               <a:t>Uses phylogenic information </a:t>
             </a:r>
           </a:p>
           <a:p>
             <a:pPr lvl="1"/>
             <a:r>
-              <a:rPr lang="en-US" dirty="0" smtClean="0"/>
+              <a:rPr lang="en-US" dirty="0"/>
               <a:t>Sum unshared branch lengths / sum all branches</a:t>
             </a:r>
           </a:p>
           <a:p>
             <a:pPr lvl="1"/>
             <a:r>
-              <a:rPr lang="en-US" dirty="0" smtClean="0"/>
-              <a:t>Both </a:t>
-            </a:r>
-            <a:r>
               <a:rPr lang="en-US" dirty="0"/>
-              <a:t>weighted </a:t>
-            </a:r>
-            <a:r>
-              <a:rPr lang="en-US" dirty="0" smtClean="0"/>
-              <a:t>and </a:t>
-            </a:r>
-            <a:r>
-              <a:rPr lang="en-US" dirty="0"/>
-              <a:t>unweighted </a:t>
-            </a:r>
-            <a:r>
-              <a:rPr lang="en-US" dirty="0" smtClean="0"/>
-              <a:t>variants</a:t>
-            </a:r>
-            <a:endParaRPr lang="en-US" dirty="0"/>
+              <a:t>Both weighted and unweighted variants</a:t>
+            </a:r>
           </a:p>
         </p:txBody>
       </p:sp>
@@ -21049,7 +20661,7 @@
           <a:lstStyle/>
           <a:p>
             <a:r>
-              <a:rPr lang="en-US" dirty="0" smtClean="0">
+              <a:rPr lang="en-US" dirty="0">
                 <a:hlinkClick r:id="rId4"/>
               </a:rPr>
               <a:t>https://www.mothur.org/wiki/Unweighted_UniFrac_algorithm</a:t>

</xml_diff>